<commit_message>
Writing Progess. Mystery Mindmap Progress.
</commit_message>
<xml_diff>
--- a/Design Documents/Narration/Narrative Map.pptx
+++ b/Design Documents/Narration/Narrative Map.pptx
@@ -7,8 +7,11 @@
   <p:sldIdLst>
     <p:sldId id="256" r:id="rId2"/>
     <p:sldId id="257" r:id="rId3"/>
-    <p:sldId id="258" r:id="rId4"/>
-    <p:sldId id="259" r:id="rId5"/>
+    <p:sldId id="260" r:id="rId4"/>
+    <p:sldId id="261" r:id="rId5"/>
+    <p:sldId id="262" r:id="rId6"/>
+    <p:sldId id="258" r:id="rId7"/>
+    <p:sldId id="259" r:id="rId8"/>
   </p:sldIdLst>
   <p:sldSz cx="12192000" cy="6858000"/>
   <p:notesSz cx="6858000" cy="9144000"/>
@@ -3410,6 +3413,69 @@
           </a:p>
         </p:txBody>
       </p:sp>
+      <p:sp>
+        <p:nvSpPr>
+          <p:cNvPr id="6" name="Rounded Rectangle 5">
+            <a:extLst>
+              <a:ext uri="{FF2B5EF4-FFF2-40B4-BE49-F238E27FC236}">
+                <a16:creationId xmlns:a16="http://schemas.microsoft.com/office/drawing/2014/main" id="{D0E65435-A15B-21CD-9C0C-7305A6E9280E}"/>
+              </a:ext>
+            </a:extLst>
+          </p:cNvPr>
+          <p:cNvSpPr/>
+          <p:nvPr/>
+        </p:nvSpPr>
+        <p:spPr>
+          <a:xfrm>
+            <a:off x="3340026" y="400051"/>
+            <a:ext cx="990674" cy="406400"/>
+          </a:xfrm>
+          <a:prstGeom prst="roundRect">
+            <a:avLst>
+              <a:gd name="adj" fmla="val 50000"/>
+            </a:avLst>
+          </a:prstGeom>
+          <a:solidFill>
+            <a:srgbClr val="FFA0A1"/>
+          </a:solidFill>
+          <a:ln w="63500">
+            <a:solidFill>
+              <a:srgbClr val="FFC000"/>
+            </a:solidFill>
+          </a:ln>
+        </p:spPr>
+        <p:style>
+          <a:lnRef idx="2">
+            <a:schemeClr val="accent1">
+              <a:shade val="15000"/>
+            </a:schemeClr>
+          </a:lnRef>
+          <a:fillRef idx="1">
+            <a:schemeClr val="accent1"/>
+          </a:fillRef>
+          <a:effectRef idx="0">
+            <a:schemeClr val="accent1"/>
+          </a:effectRef>
+          <a:fontRef idx="minor">
+            <a:schemeClr val="lt1"/>
+          </a:fontRef>
+        </p:style>
+        <p:txBody>
+          <a:bodyPr rtlCol="0" anchor="ctr"/>
+          <a:lstStyle/>
+          <a:p>
+            <a:pPr algn="ctr"/>
+            <a:r>
+              <a:rPr lang="en-CH" sz="1000" dirty="0">
+                <a:solidFill>
+                  <a:schemeClr val="tx1"/>
+                </a:solidFill>
+              </a:rPr>
+              <a:t>The Skeleton</a:t>
+            </a:r>
+          </a:p>
+        </p:txBody>
+      </p:sp>
     </p:spTree>
     <p:extLst>
       <p:ext uri="{BB962C8B-B14F-4D97-AF65-F5344CB8AC3E}">
@@ -3500,11 +3566,199 @@
             <a:pPr algn="ctr"/>
             <a:r>
               <a:rPr lang="en-CH" dirty="0"/>
-              <a:t>THE CULTIST’S FATE</a:t>
-            </a:r>
-          </a:p>
-        </p:txBody>
-      </p:sp>
+              <a:t>ENLIGHTENED’S FATE</a:t>
+            </a:r>
+          </a:p>
+        </p:txBody>
+      </p:sp>
+      <p:sp>
+        <p:nvSpPr>
+          <p:cNvPr id="3" name="Rounded Rectangle 2">
+            <a:extLst>
+              <a:ext uri="{FF2B5EF4-FFF2-40B4-BE49-F238E27FC236}">
+                <a16:creationId xmlns:a16="http://schemas.microsoft.com/office/drawing/2014/main" id="{85B5168E-1D5E-9004-9AAC-727E693131B5}"/>
+              </a:ext>
+            </a:extLst>
+          </p:cNvPr>
+          <p:cNvSpPr/>
+          <p:nvPr/>
+        </p:nvSpPr>
+        <p:spPr>
+          <a:xfrm>
+            <a:off x="3340026" y="400051"/>
+            <a:ext cx="990674" cy="406400"/>
+          </a:xfrm>
+          <a:prstGeom prst="roundRect">
+            <a:avLst>
+              <a:gd name="adj" fmla="val 50000"/>
+            </a:avLst>
+          </a:prstGeom>
+          <a:solidFill>
+            <a:schemeClr val="accent6">
+              <a:lumMod val="20000"/>
+              <a:lumOff val="80000"/>
+            </a:schemeClr>
+          </a:solidFill>
+          <a:ln w="63500">
+            <a:solidFill>
+              <a:srgbClr val="FFC000"/>
+            </a:solidFill>
+          </a:ln>
+        </p:spPr>
+        <p:style>
+          <a:lnRef idx="2">
+            <a:schemeClr val="accent1">
+              <a:shade val="15000"/>
+            </a:schemeClr>
+          </a:lnRef>
+          <a:fillRef idx="1">
+            <a:schemeClr val="accent1"/>
+          </a:fillRef>
+          <a:effectRef idx="0">
+            <a:schemeClr val="accent1"/>
+          </a:effectRef>
+          <a:fontRef idx="minor">
+            <a:schemeClr val="lt1"/>
+          </a:fontRef>
+        </p:style>
+        <p:txBody>
+          <a:bodyPr rtlCol="0" anchor="ctr"/>
+          <a:lstStyle/>
+          <a:p>
+            <a:pPr algn="ctr"/>
+            <a:r>
+              <a:rPr lang="en-CH" sz="1000" dirty="0">
+                <a:solidFill>
+                  <a:schemeClr val="tx1"/>
+                </a:solidFill>
+              </a:rPr>
+              <a:t>Appears in conversation</a:t>
+            </a:r>
+          </a:p>
+        </p:txBody>
+      </p:sp>
+      <p:sp>
+        <p:nvSpPr>
+          <p:cNvPr id="5" name="Rounded Rectangle 4">
+            <a:extLst>
+              <a:ext uri="{FF2B5EF4-FFF2-40B4-BE49-F238E27FC236}">
+                <a16:creationId xmlns:a16="http://schemas.microsoft.com/office/drawing/2014/main" id="{CF2F8AD0-F101-8C83-3510-8DCF9507F028}"/>
+              </a:ext>
+            </a:extLst>
+          </p:cNvPr>
+          <p:cNvSpPr/>
+          <p:nvPr/>
+        </p:nvSpPr>
+        <p:spPr>
+          <a:xfrm>
+            <a:off x="3213271" y="1860654"/>
+            <a:ext cx="1244183" cy="539646"/>
+          </a:xfrm>
+          <a:prstGeom prst="roundRect">
+            <a:avLst>
+              <a:gd name="adj" fmla="val 14576"/>
+            </a:avLst>
+          </a:prstGeom>
+          <a:solidFill>
+            <a:schemeClr val="bg1"/>
+          </a:solidFill>
+          <a:ln>
+            <a:solidFill>
+              <a:schemeClr val="tx2"/>
+            </a:solidFill>
+          </a:ln>
+        </p:spPr>
+        <p:style>
+          <a:lnRef idx="2">
+            <a:schemeClr val="accent1">
+              <a:shade val="15000"/>
+            </a:schemeClr>
+          </a:lnRef>
+          <a:fillRef idx="1">
+            <a:schemeClr val="accent1"/>
+          </a:fillRef>
+          <a:effectRef idx="0">
+            <a:schemeClr val="accent1"/>
+          </a:effectRef>
+          <a:fontRef idx="minor">
+            <a:schemeClr val="lt1"/>
+          </a:fontRef>
+        </p:style>
+        <p:txBody>
+          <a:bodyPr rtlCol="0" anchor="ctr"/>
+          <a:lstStyle/>
+          <a:p>
+            <a:pPr algn="ctr"/>
+            <a:r>
+              <a:rPr lang="en-CH" sz="1000" dirty="0">
+                <a:solidFill>
+                  <a:schemeClr val="tx1"/>
+                </a:solidFill>
+              </a:rPr>
+              <a:t>They were burried</a:t>
+            </a:r>
+          </a:p>
+        </p:txBody>
+      </p:sp>
+      <p:cxnSp>
+        <p:nvCxnSpPr>
+          <p:cNvPr id="6" name="Curved Connector 5">
+            <a:extLst>
+              <a:ext uri="{FF2B5EF4-FFF2-40B4-BE49-F238E27FC236}">
+                <a16:creationId xmlns:a16="http://schemas.microsoft.com/office/drawing/2014/main" id="{A8B6D9C4-36A6-46C6-626D-AEC7120E0C68}"/>
+              </a:ext>
+            </a:extLst>
+          </p:cNvPr>
+          <p:cNvCxnSpPr>
+            <a:cxnSpLocks/>
+            <a:stCxn id="3" idx="2"/>
+            <a:endCxn id="5" idx="0"/>
+          </p:cNvCxnSpPr>
+          <p:nvPr/>
+        </p:nvCxnSpPr>
+        <p:spPr>
+          <a:xfrm rot="5400000">
+            <a:off x="3308262" y="1333552"/>
+            <a:ext cx="1054203" cy="12700"/>
+          </a:xfrm>
+          <a:prstGeom prst="curvedConnector3">
+            <a:avLst>
+              <a:gd name="adj1" fmla="val 50000"/>
+            </a:avLst>
+          </a:prstGeom>
+          <a:ln w="12700">
+            <a:gradFill flip="none" rotWithShape="1">
+              <a:gsLst>
+                <a:gs pos="0">
+                  <a:schemeClr val="accent2">
+                    <a:lumMod val="50000"/>
+                  </a:schemeClr>
+                </a:gs>
+                <a:gs pos="100000">
+                  <a:schemeClr val="accent4"/>
+                </a:gs>
+              </a:gsLst>
+              <a:lin ang="2700000" scaled="1"/>
+              <a:tileRect/>
+            </a:gradFill>
+            <a:tailEnd type="triangle"/>
+          </a:ln>
+        </p:spPr>
+        <p:style>
+          <a:lnRef idx="1">
+            <a:schemeClr val="accent1"/>
+          </a:lnRef>
+          <a:fillRef idx="0">
+            <a:schemeClr val="accent1"/>
+          </a:fillRef>
+          <a:effectRef idx="0">
+            <a:schemeClr val="accent1"/>
+          </a:effectRef>
+          <a:fontRef idx="minor">
+            <a:schemeClr val="tx1"/>
+          </a:fontRef>
+        </p:style>
+      </p:cxnSp>
     </p:spTree>
     <p:extLst>
       <p:ext uri="{BB962C8B-B14F-4D97-AF65-F5344CB8AC3E}">
@@ -3564,6 +3818,1048 @@
             <a:avLst/>
           </a:prstGeom>
           <a:solidFill>
+            <a:schemeClr val="accent6"/>
+          </a:solidFill>
+          <a:ln w="38100">
+            <a:solidFill>
+              <a:schemeClr val="tx2"/>
+            </a:solidFill>
+          </a:ln>
+        </p:spPr>
+        <p:style>
+          <a:lnRef idx="2">
+            <a:schemeClr val="accent1">
+              <a:shade val="15000"/>
+            </a:schemeClr>
+          </a:lnRef>
+          <a:fillRef idx="1">
+            <a:schemeClr val="accent1"/>
+          </a:fillRef>
+          <a:effectRef idx="0">
+            <a:schemeClr val="accent1"/>
+          </a:effectRef>
+          <a:fontRef idx="minor">
+            <a:schemeClr val="lt1"/>
+          </a:fontRef>
+        </p:style>
+        <p:txBody>
+          <a:bodyPr rtlCol="0" anchor="ctr"/>
+          <a:lstStyle/>
+          <a:p>
+            <a:pPr algn="ctr"/>
+            <a:r>
+              <a:rPr lang="en-CH" dirty="0"/>
+              <a:t>RIGID’S FATE</a:t>
+            </a:r>
+          </a:p>
+        </p:txBody>
+      </p:sp>
+      <p:sp>
+        <p:nvSpPr>
+          <p:cNvPr id="2" name="Rounded Rectangle 1">
+            <a:extLst>
+              <a:ext uri="{FF2B5EF4-FFF2-40B4-BE49-F238E27FC236}">
+                <a16:creationId xmlns:a16="http://schemas.microsoft.com/office/drawing/2014/main" id="{B7023414-F832-A3B3-0230-B3679000BF65}"/>
+              </a:ext>
+            </a:extLst>
+          </p:cNvPr>
+          <p:cNvSpPr/>
+          <p:nvPr/>
+        </p:nvSpPr>
+        <p:spPr>
+          <a:xfrm>
+            <a:off x="3340026" y="400051"/>
+            <a:ext cx="990674" cy="406400"/>
+          </a:xfrm>
+          <a:prstGeom prst="roundRect">
+            <a:avLst>
+              <a:gd name="adj" fmla="val 50000"/>
+            </a:avLst>
+          </a:prstGeom>
+          <a:solidFill>
+            <a:schemeClr val="accent6">
+              <a:lumMod val="20000"/>
+              <a:lumOff val="80000"/>
+            </a:schemeClr>
+          </a:solidFill>
+          <a:ln w="63500">
+            <a:solidFill>
+              <a:srgbClr val="FFC000"/>
+            </a:solidFill>
+          </a:ln>
+        </p:spPr>
+        <p:style>
+          <a:lnRef idx="2">
+            <a:schemeClr val="accent1">
+              <a:shade val="15000"/>
+            </a:schemeClr>
+          </a:lnRef>
+          <a:fillRef idx="1">
+            <a:schemeClr val="accent1"/>
+          </a:fillRef>
+          <a:effectRef idx="0">
+            <a:schemeClr val="accent1"/>
+          </a:effectRef>
+          <a:fontRef idx="minor">
+            <a:schemeClr val="lt1"/>
+          </a:fontRef>
+        </p:style>
+        <p:txBody>
+          <a:bodyPr rtlCol="0" anchor="ctr"/>
+          <a:lstStyle/>
+          <a:p>
+            <a:pPr algn="ctr"/>
+            <a:r>
+              <a:rPr lang="en-CH" sz="1000" dirty="0">
+                <a:solidFill>
+                  <a:schemeClr val="tx1"/>
+                </a:solidFill>
+              </a:rPr>
+              <a:t>Appears in conversation</a:t>
+            </a:r>
+          </a:p>
+        </p:txBody>
+      </p:sp>
+      <p:sp>
+        <p:nvSpPr>
+          <p:cNvPr id="5" name="Rounded Rectangle 4">
+            <a:extLst>
+              <a:ext uri="{FF2B5EF4-FFF2-40B4-BE49-F238E27FC236}">
+                <a16:creationId xmlns:a16="http://schemas.microsoft.com/office/drawing/2014/main" id="{57B7353A-9FDE-7338-8B33-DCB6FE0D74BF}"/>
+              </a:ext>
+            </a:extLst>
+          </p:cNvPr>
+          <p:cNvSpPr/>
+          <p:nvPr/>
+        </p:nvSpPr>
+        <p:spPr>
+          <a:xfrm>
+            <a:off x="3340026" y="5632554"/>
+            <a:ext cx="1244183" cy="539646"/>
+          </a:xfrm>
+          <a:prstGeom prst="roundRect">
+            <a:avLst>
+              <a:gd name="adj" fmla="val 14576"/>
+            </a:avLst>
+          </a:prstGeom>
+          <a:solidFill>
+            <a:schemeClr val="bg1"/>
+          </a:solidFill>
+          <a:ln>
+            <a:solidFill>
+              <a:schemeClr val="tx2"/>
+            </a:solidFill>
+          </a:ln>
+        </p:spPr>
+        <p:style>
+          <a:lnRef idx="2">
+            <a:schemeClr val="accent1">
+              <a:shade val="15000"/>
+            </a:schemeClr>
+          </a:lnRef>
+          <a:fillRef idx="1">
+            <a:schemeClr val="accent1"/>
+          </a:fillRef>
+          <a:effectRef idx="0">
+            <a:schemeClr val="accent1"/>
+          </a:effectRef>
+          <a:fontRef idx="minor">
+            <a:schemeClr val="lt1"/>
+          </a:fontRef>
+        </p:style>
+        <p:txBody>
+          <a:bodyPr rtlCol="0" anchor="ctr"/>
+          <a:lstStyle/>
+          <a:p>
+            <a:pPr algn="ctr"/>
+            <a:r>
+              <a:rPr lang="en-CH" sz="1000" dirty="0">
+                <a:solidFill>
+                  <a:schemeClr val="tx1"/>
+                </a:solidFill>
+              </a:rPr>
+              <a:t>They were murdered</a:t>
+            </a:r>
+          </a:p>
+        </p:txBody>
+      </p:sp>
+    </p:spTree>
+    <p:extLst>
+      <p:ext uri="{BB962C8B-B14F-4D97-AF65-F5344CB8AC3E}">
+        <p14:creationId xmlns:p14="http://schemas.microsoft.com/office/powerpoint/2010/main" val="2246329434"/>
+      </p:ext>
+    </p:extLst>
+  </p:cSld>
+  <p:clrMapOvr>
+    <a:masterClrMapping/>
+  </p:clrMapOvr>
+</p:sld>
+</file>
+
+<file path=ppt/slides/slide4.xml><?xml version="1.0" encoding="utf-8"?>
+<p:sld xmlns:a="http://schemas.openxmlformats.org/drawingml/2006/main" xmlns:r="http://schemas.openxmlformats.org/officeDocument/2006/relationships" xmlns:p="http://schemas.openxmlformats.org/presentationml/2006/main">
+  <p:cSld>
+    <p:bg>
+      <p:bgPr>
+        <a:solidFill>
+          <a:schemeClr val="tx1"/>
+        </a:solidFill>
+        <a:effectLst/>
+      </p:bgPr>
+    </p:bg>
+    <p:spTree>
+      <p:nvGrpSpPr>
+        <p:cNvPr id="1" name=""/>
+        <p:cNvGrpSpPr/>
+        <p:nvPr/>
+      </p:nvGrpSpPr>
+      <p:grpSpPr>
+        <a:xfrm>
+          <a:off x="0" y="0"/>
+          <a:ext cx="0" cy="0"/>
+          <a:chOff x="0" y="0"/>
+          <a:chExt cx="0" cy="0"/>
+        </a:xfrm>
+      </p:grpSpPr>
+      <p:sp>
+        <p:nvSpPr>
+          <p:cNvPr id="4" name="Rounded Rectangle 3">
+            <a:extLst>
+              <a:ext uri="{FF2B5EF4-FFF2-40B4-BE49-F238E27FC236}">
+                <a16:creationId xmlns:a16="http://schemas.microsoft.com/office/drawing/2014/main" id="{1E6D60B5-3632-4FE6-170A-DB3FFF9C9737}"/>
+              </a:ext>
+            </a:extLst>
+          </p:cNvPr>
+          <p:cNvSpPr/>
+          <p:nvPr/>
+        </p:nvSpPr>
+        <p:spPr>
+          <a:xfrm>
+            <a:off x="220489" y="276654"/>
+            <a:ext cx="2822515" cy="577785"/>
+          </a:xfrm>
+          <a:prstGeom prst="roundRect">
+            <a:avLst/>
+          </a:prstGeom>
+          <a:solidFill>
+            <a:schemeClr val="accent6"/>
+          </a:solidFill>
+          <a:ln w="38100">
+            <a:solidFill>
+              <a:schemeClr val="tx2"/>
+            </a:solidFill>
+          </a:ln>
+        </p:spPr>
+        <p:style>
+          <a:lnRef idx="2">
+            <a:schemeClr val="accent1">
+              <a:shade val="15000"/>
+            </a:schemeClr>
+          </a:lnRef>
+          <a:fillRef idx="1">
+            <a:schemeClr val="accent1"/>
+          </a:fillRef>
+          <a:effectRef idx="0">
+            <a:schemeClr val="accent1"/>
+          </a:effectRef>
+          <a:fontRef idx="minor">
+            <a:schemeClr val="lt1"/>
+          </a:fontRef>
+        </p:style>
+        <p:txBody>
+          <a:bodyPr rtlCol="0" anchor="ctr"/>
+          <a:lstStyle/>
+          <a:p>
+            <a:pPr algn="ctr"/>
+            <a:r>
+              <a:rPr lang="en-CH" dirty="0"/>
+              <a:t>LOOSE’S FATE</a:t>
+            </a:r>
+          </a:p>
+        </p:txBody>
+      </p:sp>
+      <p:sp>
+        <p:nvSpPr>
+          <p:cNvPr id="2" name="Rounded Rectangle 1">
+            <a:extLst>
+              <a:ext uri="{FF2B5EF4-FFF2-40B4-BE49-F238E27FC236}">
+                <a16:creationId xmlns:a16="http://schemas.microsoft.com/office/drawing/2014/main" id="{0137F877-3C7B-5F8C-E880-BC472C29CD96}"/>
+              </a:ext>
+            </a:extLst>
+          </p:cNvPr>
+          <p:cNvSpPr/>
+          <p:nvPr/>
+        </p:nvSpPr>
+        <p:spPr>
+          <a:xfrm>
+            <a:off x="3340026" y="400051"/>
+            <a:ext cx="990674" cy="406400"/>
+          </a:xfrm>
+          <a:prstGeom prst="roundRect">
+            <a:avLst>
+              <a:gd name="adj" fmla="val 50000"/>
+            </a:avLst>
+          </a:prstGeom>
+          <a:solidFill>
+            <a:schemeClr val="accent6">
+              <a:lumMod val="20000"/>
+              <a:lumOff val="80000"/>
+            </a:schemeClr>
+          </a:solidFill>
+          <a:ln w="63500">
+            <a:solidFill>
+              <a:srgbClr val="FFC000"/>
+            </a:solidFill>
+          </a:ln>
+        </p:spPr>
+        <p:style>
+          <a:lnRef idx="2">
+            <a:schemeClr val="accent1">
+              <a:shade val="15000"/>
+            </a:schemeClr>
+          </a:lnRef>
+          <a:fillRef idx="1">
+            <a:schemeClr val="accent1"/>
+          </a:fillRef>
+          <a:effectRef idx="0">
+            <a:schemeClr val="accent1"/>
+          </a:effectRef>
+          <a:fontRef idx="minor">
+            <a:schemeClr val="lt1"/>
+          </a:fontRef>
+        </p:style>
+        <p:txBody>
+          <a:bodyPr rtlCol="0" anchor="ctr"/>
+          <a:lstStyle/>
+          <a:p>
+            <a:pPr algn="ctr"/>
+            <a:r>
+              <a:rPr lang="en-CH" sz="1000" dirty="0">
+                <a:solidFill>
+                  <a:schemeClr val="tx1"/>
+                </a:solidFill>
+              </a:rPr>
+              <a:t>Appears in conversation</a:t>
+            </a:r>
+          </a:p>
+        </p:txBody>
+      </p:sp>
+      <p:sp>
+        <p:nvSpPr>
+          <p:cNvPr id="3" name="Rounded Rectangle 2">
+            <a:extLst>
+              <a:ext uri="{FF2B5EF4-FFF2-40B4-BE49-F238E27FC236}">
+                <a16:creationId xmlns:a16="http://schemas.microsoft.com/office/drawing/2014/main" id="{A49595CA-F363-FB58-ADE6-32AE82D98106}"/>
+              </a:ext>
+            </a:extLst>
+          </p:cNvPr>
+          <p:cNvSpPr/>
+          <p:nvPr/>
+        </p:nvSpPr>
+        <p:spPr>
+          <a:xfrm>
+            <a:off x="3340026" y="5632554"/>
+            <a:ext cx="1244183" cy="539646"/>
+          </a:xfrm>
+          <a:prstGeom prst="roundRect">
+            <a:avLst>
+              <a:gd name="adj" fmla="val 14576"/>
+            </a:avLst>
+          </a:prstGeom>
+          <a:solidFill>
+            <a:schemeClr val="bg1"/>
+          </a:solidFill>
+          <a:ln>
+            <a:solidFill>
+              <a:schemeClr val="tx2"/>
+            </a:solidFill>
+          </a:ln>
+        </p:spPr>
+        <p:style>
+          <a:lnRef idx="2">
+            <a:schemeClr val="accent1">
+              <a:shade val="15000"/>
+            </a:schemeClr>
+          </a:lnRef>
+          <a:fillRef idx="1">
+            <a:schemeClr val="accent1"/>
+          </a:fillRef>
+          <a:effectRef idx="0">
+            <a:schemeClr val="accent1"/>
+          </a:effectRef>
+          <a:fontRef idx="minor">
+            <a:schemeClr val="lt1"/>
+          </a:fontRef>
+        </p:style>
+        <p:txBody>
+          <a:bodyPr rtlCol="0" anchor="ctr"/>
+          <a:lstStyle/>
+          <a:p>
+            <a:pPr algn="ctr"/>
+            <a:r>
+              <a:rPr lang="en-CH" sz="1000" dirty="0">
+                <a:solidFill>
+                  <a:schemeClr val="tx1"/>
+                </a:solidFill>
+              </a:rPr>
+              <a:t>They were left to die</a:t>
+            </a:r>
+          </a:p>
+        </p:txBody>
+      </p:sp>
+    </p:spTree>
+    <p:extLst>
+      <p:ext uri="{BB962C8B-B14F-4D97-AF65-F5344CB8AC3E}">
+        <p14:creationId xmlns:p14="http://schemas.microsoft.com/office/powerpoint/2010/main" val="1054204220"/>
+      </p:ext>
+    </p:extLst>
+  </p:cSld>
+  <p:clrMapOvr>
+    <a:masterClrMapping/>
+  </p:clrMapOvr>
+</p:sld>
+</file>
+
+<file path=ppt/slides/slide5.xml><?xml version="1.0" encoding="utf-8"?>
+<p:sld xmlns:a="http://schemas.openxmlformats.org/drawingml/2006/main" xmlns:r="http://schemas.openxmlformats.org/officeDocument/2006/relationships" xmlns:p="http://schemas.openxmlformats.org/presentationml/2006/main">
+  <p:cSld>
+    <p:bg>
+      <p:bgPr>
+        <a:solidFill>
+          <a:schemeClr val="tx1"/>
+        </a:solidFill>
+        <a:effectLst/>
+      </p:bgPr>
+    </p:bg>
+    <p:spTree>
+      <p:nvGrpSpPr>
+        <p:cNvPr id="1" name=""/>
+        <p:cNvGrpSpPr/>
+        <p:nvPr/>
+      </p:nvGrpSpPr>
+      <p:grpSpPr>
+        <a:xfrm>
+          <a:off x="0" y="0"/>
+          <a:ext cx="0" cy="0"/>
+          <a:chOff x="0" y="0"/>
+          <a:chExt cx="0" cy="0"/>
+        </a:xfrm>
+      </p:grpSpPr>
+      <p:sp>
+        <p:nvSpPr>
+          <p:cNvPr id="4" name="Rounded Rectangle 3">
+            <a:extLst>
+              <a:ext uri="{FF2B5EF4-FFF2-40B4-BE49-F238E27FC236}">
+                <a16:creationId xmlns:a16="http://schemas.microsoft.com/office/drawing/2014/main" id="{1E6D60B5-3632-4FE6-170A-DB3FFF9C9737}"/>
+              </a:ext>
+            </a:extLst>
+          </p:cNvPr>
+          <p:cNvSpPr/>
+          <p:nvPr/>
+        </p:nvSpPr>
+        <p:spPr>
+          <a:xfrm>
+            <a:off x="220489" y="276654"/>
+            <a:ext cx="2822515" cy="577785"/>
+          </a:xfrm>
+          <a:prstGeom prst="roundRect">
+            <a:avLst/>
+          </a:prstGeom>
+          <a:solidFill>
+            <a:schemeClr val="accent6"/>
+          </a:solidFill>
+          <a:ln w="38100">
+            <a:solidFill>
+              <a:schemeClr val="tx2"/>
+            </a:solidFill>
+          </a:ln>
+        </p:spPr>
+        <p:style>
+          <a:lnRef idx="2">
+            <a:schemeClr val="accent1">
+              <a:shade val="15000"/>
+            </a:schemeClr>
+          </a:lnRef>
+          <a:fillRef idx="1">
+            <a:schemeClr val="accent1"/>
+          </a:fillRef>
+          <a:effectRef idx="0">
+            <a:schemeClr val="accent1"/>
+          </a:effectRef>
+          <a:fontRef idx="minor">
+            <a:schemeClr val="lt1"/>
+          </a:fontRef>
+        </p:style>
+        <p:txBody>
+          <a:bodyPr rtlCol="0" anchor="ctr"/>
+          <a:lstStyle/>
+          <a:p>
+            <a:pPr algn="ctr"/>
+            <a:r>
+              <a:rPr lang="en-CH" dirty="0"/>
+              <a:t>SHAPED FATE</a:t>
+            </a:r>
+          </a:p>
+        </p:txBody>
+      </p:sp>
+      <p:sp>
+        <p:nvSpPr>
+          <p:cNvPr id="2" name="Rounded Rectangle 1">
+            <a:extLst>
+              <a:ext uri="{FF2B5EF4-FFF2-40B4-BE49-F238E27FC236}">
+                <a16:creationId xmlns:a16="http://schemas.microsoft.com/office/drawing/2014/main" id="{12B4C064-7D3B-ED2E-3158-9E520E1AA7E4}"/>
+              </a:ext>
+            </a:extLst>
+          </p:cNvPr>
+          <p:cNvSpPr/>
+          <p:nvPr/>
+        </p:nvSpPr>
+        <p:spPr>
+          <a:xfrm>
+            <a:off x="3340026" y="400051"/>
+            <a:ext cx="990674" cy="406400"/>
+          </a:xfrm>
+          <a:prstGeom prst="roundRect">
+            <a:avLst>
+              <a:gd name="adj" fmla="val 50000"/>
+            </a:avLst>
+          </a:prstGeom>
+          <a:solidFill>
+            <a:schemeClr val="accent6">
+              <a:lumMod val="20000"/>
+              <a:lumOff val="80000"/>
+            </a:schemeClr>
+          </a:solidFill>
+          <a:ln w="63500">
+            <a:solidFill>
+              <a:srgbClr val="FFC000"/>
+            </a:solidFill>
+          </a:ln>
+        </p:spPr>
+        <p:style>
+          <a:lnRef idx="2">
+            <a:schemeClr val="accent1">
+              <a:shade val="15000"/>
+            </a:schemeClr>
+          </a:lnRef>
+          <a:fillRef idx="1">
+            <a:schemeClr val="accent1"/>
+          </a:fillRef>
+          <a:effectRef idx="0">
+            <a:schemeClr val="accent1"/>
+          </a:effectRef>
+          <a:fontRef idx="minor">
+            <a:schemeClr val="lt1"/>
+          </a:fontRef>
+        </p:style>
+        <p:txBody>
+          <a:bodyPr rtlCol="0" anchor="ctr"/>
+          <a:lstStyle/>
+          <a:p>
+            <a:pPr algn="ctr"/>
+            <a:r>
+              <a:rPr lang="en-CH" sz="1000" dirty="0">
+                <a:solidFill>
+                  <a:schemeClr val="tx1"/>
+                </a:solidFill>
+              </a:rPr>
+              <a:t>Appears in conversation</a:t>
+            </a:r>
+          </a:p>
+        </p:txBody>
+      </p:sp>
+      <p:sp>
+        <p:nvSpPr>
+          <p:cNvPr id="3" name="Rounded Rectangle 2">
+            <a:extLst>
+              <a:ext uri="{FF2B5EF4-FFF2-40B4-BE49-F238E27FC236}">
+                <a16:creationId xmlns:a16="http://schemas.microsoft.com/office/drawing/2014/main" id="{0F060F1B-AFD5-F45D-C137-5971A44A16A1}"/>
+              </a:ext>
+            </a:extLst>
+          </p:cNvPr>
+          <p:cNvSpPr/>
+          <p:nvPr/>
+        </p:nvSpPr>
+        <p:spPr>
+          <a:xfrm>
+            <a:off x="3340026" y="3727554"/>
+            <a:ext cx="1244183" cy="539646"/>
+          </a:xfrm>
+          <a:prstGeom prst="roundRect">
+            <a:avLst>
+              <a:gd name="adj" fmla="val 14576"/>
+            </a:avLst>
+          </a:prstGeom>
+          <a:solidFill>
+            <a:schemeClr val="bg1"/>
+          </a:solidFill>
+          <a:ln>
+            <a:solidFill>
+              <a:schemeClr val="tx2"/>
+            </a:solidFill>
+          </a:ln>
+        </p:spPr>
+        <p:style>
+          <a:lnRef idx="2">
+            <a:schemeClr val="accent1">
+              <a:shade val="15000"/>
+            </a:schemeClr>
+          </a:lnRef>
+          <a:fillRef idx="1">
+            <a:schemeClr val="accent1"/>
+          </a:fillRef>
+          <a:effectRef idx="0">
+            <a:schemeClr val="accent1"/>
+          </a:effectRef>
+          <a:fontRef idx="minor">
+            <a:schemeClr val="lt1"/>
+          </a:fontRef>
+        </p:style>
+        <p:txBody>
+          <a:bodyPr rtlCol="0" anchor="ctr"/>
+          <a:lstStyle/>
+          <a:p>
+            <a:pPr algn="ctr"/>
+            <a:r>
+              <a:rPr lang="en-CH" sz="1000" dirty="0">
+                <a:solidFill>
+                  <a:schemeClr val="tx1"/>
+                </a:solidFill>
+              </a:rPr>
+              <a:t>They left the Temple</a:t>
+            </a:r>
+          </a:p>
+        </p:txBody>
+      </p:sp>
+      <p:sp>
+        <p:nvSpPr>
+          <p:cNvPr id="5" name="Rounded Rectangle 4">
+            <a:extLst>
+              <a:ext uri="{FF2B5EF4-FFF2-40B4-BE49-F238E27FC236}">
+                <a16:creationId xmlns:a16="http://schemas.microsoft.com/office/drawing/2014/main" id="{01B07EB4-697A-1A4D-DAAB-82985FF351B6}"/>
+              </a:ext>
+            </a:extLst>
+          </p:cNvPr>
+          <p:cNvSpPr/>
+          <p:nvPr/>
+        </p:nvSpPr>
+        <p:spPr>
+          <a:xfrm>
+            <a:off x="2755128" y="4826210"/>
+            <a:ext cx="1244183" cy="539646"/>
+          </a:xfrm>
+          <a:prstGeom prst="roundRect">
+            <a:avLst>
+              <a:gd name="adj" fmla="val 14576"/>
+            </a:avLst>
+          </a:prstGeom>
+          <a:solidFill>
+            <a:schemeClr val="bg1"/>
+          </a:solidFill>
+          <a:ln>
+            <a:solidFill>
+              <a:schemeClr val="tx2"/>
+            </a:solidFill>
+          </a:ln>
+        </p:spPr>
+        <p:style>
+          <a:lnRef idx="2">
+            <a:schemeClr val="accent1">
+              <a:shade val="15000"/>
+            </a:schemeClr>
+          </a:lnRef>
+          <a:fillRef idx="1">
+            <a:schemeClr val="accent1"/>
+          </a:fillRef>
+          <a:effectRef idx="0">
+            <a:schemeClr val="accent1"/>
+          </a:effectRef>
+          <a:fontRef idx="minor">
+            <a:schemeClr val="lt1"/>
+          </a:fontRef>
+        </p:style>
+        <p:txBody>
+          <a:bodyPr rtlCol="0" anchor="ctr"/>
+          <a:lstStyle/>
+          <a:p>
+            <a:pPr algn="ctr"/>
+            <a:r>
+              <a:rPr lang="en-CH" sz="1000" dirty="0">
+                <a:solidFill>
+                  <a:schemeClr val="tx1"/>
+                </a:solidFill>
+              </a:rPr>
+              <a:t>They made clay people</a:t>
+            </a:r>
+          </a:p>
+        </p:txBody>
+      </p:sp>
+      <p:cxnSp>
+        <p:nvCxnSpPr>
+          <p:cNvPr id="6" name="Curved Connector 5">
+            <a:extLst>
+              <a:ext uri="{FF2B5EF4-FFF2-40B4-BE49-F238E27FC236}">
+                <a16:creationId xmlns:a16="http://schemas.microsoft.com/office/drawing/2014/main" id="{E36A0EFD-EEDB-6DC0-30D9-E812410F39BF}"/>
+              </a:ext>
+            </a:extLst>
+          </p:cNvPr>
+          <p:cNvCxnSpPr>
+            <a:cxnSpLocks/>
+            <a:stCxn id="3" idx="2"/>
+            <a:endCxn id="5" idx="0"/>
+          </p:cNvCxnSpPr>
+          <p:nvPr/>
+        </p:nvCxnSpPr>
+        <p:spPr>
+          <a:xfrm rot="5400000">
+            <a:off x="3390164" y="4254256"/>
+            <a:ext cx="559010" cy="584898"/>
+          </a:xfrm>
+          <a:prstGeom prst="curvedConnector3">
+            <a:avLst>
+              <a:gd name="adj1" fmla="val 50000"/>
+            </a:avLst>
+          </a:prstGeom>
+          <a:ln w="12700">
+            <a:gradFill flip="none" rotWithShape="1">
+              <a:gsLst>
+                <a:gs pos="0">
+                  <a:schemeClr val="accent2">
+                    <a:lumMod val="50000"/>
+                  </a:schemeClr>
+                </a:gs>
+                <a:gs pos="100000">
+                  <a:schemeClr val="accent4"/>
+                </a:gs>
+              </a:gsLst>
+              <a:lin ang="2700000" scaled="1"/>
+              <a:tileRect/>
+            </a:gradFill>
+            <a:tailEnd type="triangle"/>
+          </a:ln>
+        </p:spPr>
+        <p:style>
+          <a:lnRef idx="1">
+            <a:schemeClr val="accent1"/>
+          </a:lnRef>
+          <a:fillRef idx="0">
+            <a:schemeClr val="accent1"/>
+          </a:fillRef>
+          <a:effectRef idx="0">
+            <a:schemeClr val="accent1"/>
+          </a:effectRef>
+          <a:fontRef idx="minor">
+            <a:schemeClr val="tx1"/>
+          </a:fontRef>
+        </p:style>
+      </p:cxnSp>
+      <p:sp>
+        <p:nvSpPr>
+          <p:cNvPr id="9" name="Rounded Rectangle 8">
+            <a:extLst>
+              <a:ext uri="{FF2B5EF4-FFF2-40B4-BE49-F238E27FC236}">
+                <a16:creationId xmlns:a16="http://schemas.microsoft.com/office/drawing/2014/main" id="{D7EA11FA-6E76-106E-3FAF-DFE007444E56}"/>
+              </a:ext>
+            </a:extLst>
+          </p:cNvPr>
+          <p:cNvSpPr/>
+          <p:nvPr/>
+        </p:nvSpPr>
+        <p:spPr>
+          <a:xfrm>
+            <a:off x="4330700" y="4826210"/>
+            <a:ext cx="1244183" cy="539646"/>
+          </a:xfrm>
+          <a:prstGeom prst="roundRect">
+            <a:avLst>
+              <a:gd name="adj" fmla="val 14576"/>
+            </a:avLst>
+          </a:prstGeom>
+          <a:solidFill>
+            <a:schemeClr val="bg1"/>
+          </a:solidFill>
+          <a:ln>
+            <a:solidFill>
+              <a:schemeClr val="tx2"/>
+            </a:solidFill>
+          </a:ln>
+        </p:spPr>
+        <p:style>
+          <a:lnRef idx="2">
+            <a:schemeClr val="accent1">
+              <a:shade val="15000"/>
+            </a:schemeClr>
+          </a:lnRef>
+          <a:fillRef idx="1">
+            <a:schemeClr val="accent1"/>
+          </a:fillRef>
+          <a:effectRef idx="0">
+            <a:schemeClr val="accent1"/>
+          </a:effectRef>
+          <a:fontRef idx="minor">
+            <a:schemeClr val="lt1"/>
+          </a:fontRef>
+        </p:style>
+        <p:txBody>
+          <a:bodyPr rtlCol="0" anchor="ctr"/>
+          <a:lstStyle/>
+          <a:p>
+            <a:pPr algn="ctr"/>
+            <a:r>
+              <a:rPr lang="en-CH" sz="1000" dirty="0">
+                <a:solidFill>
+                  <a:schemeClr val="tx1"/>
+                </a:solidFill>
+              </a:rPr>
+              <a:t>They killed the Rigid One</a:t>
+            </a:r>
+          </a:p>
+        </p:txBody>
+      </p:sp>
+      <p:cxnSp>
+        <p:nvCxnSpPr>
+          <p:cNvPr id="10" name="Curved Connector 9">
+            <a:extLst>
+              <a:ext uri="{FF2B5EF4-FFF2-40B4-BE49-F238E27FC236}">
+                <a16:creationId xmlns:a16="http://schemas.microsoft.com/office/drawing/2014/main" id="{A380C18D-FE02-7550-22B9-9C931F04B45D}"/>
+              </a:ext>
+            </a:extLst>
+          </p:cNvPr>
+          <p:cNvCxnSpPr>
+            <a:cxnSpLocks/>
+            <a:stCxn id="3" idx="2"/>
+            <a:endCxn id="9" idx="0"/>
+          </p:cNvCxnSpPr>
+          <p:nvPr/>
+        </p:nvCxnSpPr>
+        <p:spPr>
+          <a:xfrm rot="16200000" flipH="1">
+            <a:off x="4177950" y="4051368"/>
+            <a:ext cx="559010" cy="990674"/>
+          </a:xfrm>
+          <a:prstGeom prst="curvedConnector3">
+            <a:avLst>
+              <a:gd name="adj1" fmla="val 50000"/>
+            </a:avLst>
+          </a:prstGeom>
+          <a:ln w="12700">
+            <a:gradFill flip="none" rotWithShape="1">
+              <a:gsLst>
+                <a:gs pos="0">
+                  <a:schemeClr val="accent2">
+                    <a:lumMod val="50000"/>
+                  </a:schemeClr>
+                </a:gs>
+                <a:gs pos="100000">
+                  <a:schemeClr val="accent4"/>
+                </a:gs>
+              </a:gsLst>
+              <a:lin ang="2700000" scaled="1"/>
+              <a:tileRect/>
+            </a:gradFill>
+            <a:tailEnd type="triangle"/>
+          </a:ln>
+        </p:spPr>
+        <p:style>
+          <a:lnRef idx="1">
+            <a:schemeClr val="accent1"/>
+          </a:lnRef>
+          <a:fillRef idx="0">
+            <a:schemeClr val="accent1"/>
+          </a:fillRef>
+          <a:effectRef idx="0">
+            <a:schemeClr val="accent1"/>
+          </a:effectRef>
+          <a:fontRef idx="minor">
+            <a:schemeClr val="tx1"/>
+          </a:fontRef>
+        </p:style>
+      </p:cxnSp>
+      <p:sp>
+        <p:nvSpPr>
+          <p:cNvPr id="15" name="Rounded Rectangle 14">
+            <a:extLst>
+              <a:ext uri="{FF2B5EF4-FFF2-40B4-BE49-F238E27FC236}">
+                <a16:creationId xmlns:a16="http://schemas.microsoft.com/office/drawing/2014/main" id="{12BA8031-83FC-F5D5-C24D-323EE7585828}"/>
+              </a:ext>
+            </a:extLst>
+          </p:cNvPr>
+          <p:cNvSpPr/>
+          <p:nvPr/>
+        </p:nvSpPr>
+        <p:spPr>
+          <a:xfrm>
+            <a:off x="5473908" y="2133598"/>
+            <a:ext cx="1244183" cy="539646"/>
+          </a:xfrm>
+          <a:prstGeom prst="roundRect">
+            <a:avLst>
+              <a:gd name="adj" fmla="val 14576"/>
+            </a:avLst>
+          </a:prstGeom>
+          <a:solidFill>
+            <a:schemeClr val="bg1"/>
+          </a:solidFill>
+          <a:ln>
+            <a:solidFill>
+              <a:schemeClr val="tx2"/>
+            </a:solidFill>
+          </a:ln>
+        </p:spPr>
+        <p:style>
+          <a:lnRef idx="2">
+            <a:schemeClr val="accent1">
+              <a:shade val="15000"/>
+            </a:schemeClr>
+          </a:lnRef>
+          <a:fillRef idx="1">
+            <a:schemeClr val="accent1"/>
+          </a:fillRef>
+          <a:effectRef idx="0">
+            <a:schemeClr val="accent1"/>
+          </a:effectRef>
+          <a:fontRef idx="minor">
+            <a:schemeClr val="lt1"/>
+          </a:fontRef>
+        </p:style>
+        <p:txBody>
+          <a:bodyPr rtlCol="0" anchor="ctr"/>
+          <a:lstStyle/>
+          <a:p>
+            <a:pPr algn="ctr"/>
+            <a:r>
+              <a:rPr lang="en-CH" sz="1000" dirty="0">
+                <a:solidFill>
+                  <a:schemeClr val="tx1"/>
+                </a:solidFill>
+              </a:rPr>
+              <a:t>They wrote their anger on the walls</a:t>
+            </a:r>
+          </a:p>
+        </p:txBody>
+      </p:sp>
+      <p:sp>
+        <p:nvSpPr>
+          <p:cNvPr id="17" name="Rounded Rectangle 16">
+            <a:extLst>
+              <a:ext uri="{FF2B5EF4-FFF2-40B4-BE49-F238E27FC236}">
+                <a16:creationId xmlns:a16="http://schemas.microsoft.com/office/drawing/2014/main" id="{C253C6CB-1DC2-8A52-E0A0-7AB8A606D4F9}"/>
+              </a:ext>
+            </a:extLst>
+          </p:cNvPr>
+          <p:cNvSpPr/>
+          <p:nvPr/>
+        </p:nvSpPr>
+        <p:spPr>
+          <a:xfrm>
+            <a:off x="901345" y="2030855"/>
+            <a:ext cx="1244183" cy="539646"/>
+          </a:xfrm>
+          <a:prstGeom prst="roundRect">
+            <a:avLst>
+              <a:gd name="adj" fmla="val 14576"/>
+            </a:avLst>
+          </a:prstGeom>
+          <a:solidFill>
+            <a:schemeClr val="bg1"/>
+          </a:solidFill>
+          <a:ln>
+            <a:solidFill>
+              <a:schemeClr val="tx2"/>
+            </a:solidFill>
+          </a:ln>
+        </p:spPr>
+        <p:style>
+          <a:lnRef idx="2">
+            <a:schemeClr val="accent1">
+              <a:shade val="15000"/>
+            </a:schemeClr>
+          </a:lnRef>
+          <a:fillRef idx="1">
+            <a:schemeClr val="accent1"/>
+          </a:fillRef>
+          <a:effectRef idx="0">
+            <a:schemeClr val="accent1"/>
+          </a:effectRef>
+          <a:fontRef idx="minor">
+            <a:schemeClr val="lt1"/>
+          </a:fontRef>
+        </p:style>
+        <p:txBody>
+          <a:bodyPr rtlCol="0" anchor="ctr"/>
+          <a:lstStyle/>
+          <a:p>
+            <a:pPr algn="ctr"/>
+            <a:r>
+              <a:rPr lang="en-CH" sz="1000" dirty="0">
+                <a:solidFill>
+                  <a:schemeClr val="tx1"/>
+                </a:solidFill>
+              </a:rPr>
+              <a:t>They were created by R and L</a:t>
+            </a:r>
+          </a:p>
+        </p:txBody>
+      </p:sp>
+    </p:spTree>
+    <p:extLst>
+      <p:ext uri="{BB962C8B-B14F-4D97-AF65-F5344CB8AC3E}">
+        <p14:creationId xmlns:p14="http://schemas.microsoft.com/office/powerpoint/2010/main" val="4165044489"/>
+      </p:ext>
+    </p:extLst>
+  </p:cSld>
+  <p:clrMapOvr>
+    <a:masterClrMapping/>
+  </p:clrMapOvr>
+</p:sld>
+</file>
+
+<file path=ppt/slides/slide6.xml><?xml version="1.0" encoding="utf-8"?>
+<p:sld xmlns:a="http://schemas.openxmlformats.org/drawingml/2006/main" xmlns:r="http://schemas.openxmlformats.org/officeDocument/2006/relationships" xmlns:p="http://schemas.openxmlformats.org/presentationml/2006/main">
+  <p:cSld>
+    <p:bg>
+      <p:bgPr>
+        <a:solidFill>
+          <a:schemeClr val="tx1"/>
+        </a:solidFill>
+        <a:effectLst/>
+      </p:bgPr>
+    </p:bg>
+    <p:spTree>
+      <p:nvGrpSpPr>
+        <p:cNvPr id="1" name=""/>
+        <p:cNvGrpSpPr/>
+        <p:nvPr/>
+      </p:nvGrpSpPr>
+      <p:grpSpPr>
+        <a:xfrm>
+          <a:off x="0" y="0"/>
+          <a:ext cx="0" cy="0"/>
+          <a:chOff x="0" y="0"/>
+          <a:chExt cx="0" cy="0"/>
+        </a:xfrm>
+      </p:grpSpPr>
+      <p:sp>
+        <p:nvSpPr>
+          <p:cNvPr id="4" name="Rounded Rectangle 3">
+            <a:extLst>
+              <a:ext uri="{FF2B5EF4-FFF2-40B4-BE49-F238E27FC236}">
+                <a16:creationId xmlns:a16="http://schemas.microsoft.com/office/drawing/2014/main" id="{1E6D60B5-3632-4FE6-170A-DB3FFF9C9737}"/>
+              </a:ext>
+            </a:extLst>
+          </p:cNvPr>
+          <p:cNvSpPr/>
+          <p:nvPr/>
+        </p:nvSpPr>
+        <p:spPr>
+          <a:xfrm>
+            <a:off x="220489" y="276654"/>
+            <a:ext cx="2822515" cy="577785"/>
+          </a:xfrm>
+          <a:prstGeom prst="roundRect">
+            <a:avLst/>
+          </a:prstGeom>
+          <a:solidFill>
             <a:srgbClr val="7030A0"/>
           </a:solidFill>
           <a:ln w="38100">
@@ -3677,7 +4973,7 @@
         </p:nvSpPr>
         <p:spPr>
           <a:xfrm>
-            <a:off x="3654480" y="1299327"/>
+            <a:off x="3173931" y="1438134"/>
             <a:ext cx="1244183" cy="539646"/>
           </a:xfrm>
           <a:prstGeom prst="roundRect">
@@ -4059,8 +5355,8 @@
         </p:nvCxnSpPr>
         <p:spPr>
           <a:xfrm rot="10800000" flipV="1">
-            <a:off x="1172714" y="1569150"/>
-            <a:ext cx="2481766" cy="1265596"/>
+            <a:off x="1172715" y="1707956"/>
+            <a:ext cx="2001217" cy="1126789"/>
           </a:xfrm>
           <a:prstGeom prst="curvedConnector2">
             <a:avLst/>
@@ -4291,8 +5587,8 @@
         </p:nvCxnSpPr>
         <p:spPr>
           <a:xfrm rot="16200000" flipH="1">
-            <a:off x="4107620" y="2007925"/>
-            <a:ext cx="1366780" cy="1028876"/>
+            <a:off x="3936749" y="1837053"/>
+            <a:ext cx="1227973" cy="1509425"/>
           </a:xfrm>
           <a:prstGeom prst="curvedConnector2">
             <a:avLst/>
@@ -4452,6 +5748,128 @@
           </a:fontRef>
         </p:style>
       </p:cxnSp>
+      <p:sp>
+        <p:nvSpPr>
+          <p:cNvPr id="55" name="Rounded Rectangle 54">
+            <a:extLst>
+              <a:ext uri="{FF2B5EF4-FFF2-40B4-BE49-F238E27FC236}">
+                <a16:creationId xmlns:a16="http://schemas.microsoft.com/office/drawing/2014/main" id="{13BBB220-7C38-C10F-E2F8-6CAE1F663E86}"/>
+              </a:ext>
+            </a:extLst>
+          </p:cNvPr>
+          <p:cNvSpPr/>
+          <p:nvPr/>
+        </p:nvSpPr>
+        <p:spPr>
+          <a:xfrm>
+            <a:off x="3340026" y="400051"/>
+            <a:ext cx="911991" cy="406400"/>
+          </a:xfrm>
+          <a:prstGeom prst="roundRect">
+            <a:avLst>
+              <a:gd name="adj" fmla="val 50000"/>
+            </a:avLst>
+          </a:prstGeom>
+          <a:solidFill>
+            <a:srgbClr val="E4C1FF"/>
+          </a:solidFill>
+          <a:ln w="63500">
+            <a:solidFill>
+              <a:srgbClr val="FFC000"/>
+            </a:solidFill>
+          </a:ln>
+        </p:spPr>
+        <p:style>
+          <a:lnRef idx="2">
+            <a:schemeClr val="accent1">
+              <a:shade val="15000"/>
+            </a:schemeClr>
+          </a:lnRef>
+          <a:fillRef idx="1">
+            <a:schemeClr val="accent1"/>
+          </a:fillRef>
+          <a:effectRef idx="0">
+            <a:schemeClr val="accent1"/>
+          </a:effectRef>
+          <a:fontRef idx="minor">
+            <a:schemeClr val="lt1"/>
+          </a:fontRef>
+        </p:style>
+        <p:txBody>
+          <a:bodyPr rtlCol="0" anchor="ctr"/>
+          <a:lstStyle/>
+          <a:p>
+            <a:pPr algn="ctr"/>
+            <a:r>
+              <a:rPr lang="en-CH" sz="1000" dirty="0">
+                <a:solidFill>
+                  <a:schemeClr val="tx1"/>
+                </a:solidFill>
+              </a:rPr>
+              <a:t>The whole temple</a:t>
+            </a:r>
+          </a:p>
+        </p:txBody>
+      </p:sp>
+      <p:cxnSp>
+        <p:nvCxnSpPr>
+          <p:cNvPr id="56" name="Curved Connector 55">
+            <a:extLst>
+              <a:ext uri="{FF2B5EF4-FFF2-40B4-BE49-F238E27FC236}">
+                <a16:creationId xmlns:a16="http://schemas.microsoft.com/office/drawing/2014/main" id="{1927B743-9EFD-B3F0-9EDB-28877993388A}"/>
+              </a:ext>
+            </a:extLst>
+          </p:cNvPr>
+          <p:cNvCxnSpPr>
+            <a:cxnSpLocks/>
+            <a:stCxn id="55" idx="2"/>
+            <a:endCxn id="3" idx="0"/>
+          </p:cNvCxnSpPr>
+          <p:nvPr/>
+        </p:nvCxnSpPr>
+        <p:spPr>
+          <a:xfrm rot="16200000" flipH="1">
+            <a:off x="3480181" y="1122291"/>
+            <a:ext cx="631683" cy="1"/>
+          </a:xfrm>
+          <a:prstGeom prst="curvedConnector3">
+            <a:avLst>
+              <a:gd name="adj1" fmla="val 50000"/>
+            </a:avLst>
+          </a:prstGeom>
+          <a:ln w="12700">
+            <a:gradFill flip="none" rotWithShape="1">
+              <a:gsLst>
+                <a:gs pos="0">
+                  <a:schemeClr val="accent2">
+                    <a:lumMod val="50000"/>
+                  </a:schemeClr>
+                </a:gs>
+                <a:gs pos="100000">
+                  <a:schemeClr val="accent4"/>
+                </a:gs>
+              </a:gsLst>
+              <a:lin ang="2700000" scaled="1"/>
+              <a:tileRect/>
+            </a:gradFill>
+            <a:tailEnd type="triangle"/>
+          </a:ln>
+        </p:spPr>
+        <p:style>
+          <a:lnRef idx="1">
+            <a:schemeClr val="accent1"/>
+          </a:lnRef>
+          <a:fillRef idx="0">
+            <a:schemeClr val="accent1"/>
+          </a:fillRef>
+          <a:effectRef idx="0">
+            <a:schemeClr val="accent1"/>
+          </a:effectRef>
+          <a:fontRef idx="minor">
+            <a:schemeClr val="tx1"/>
+          </a:fontRef>
+        </p:style>
+      </p:cxnSp>
     </p:spTree>
     <p:extLst>
       <p:ext uri="{BB962C8B-B14F-4D97-AF65-F5344CB8AC3E}">
@@ -4465,7 +5883,7 @@
 </p:sld>
 </file>
 
-<file path=ppt/slides/slide4.xml><?xml version="1.0" encoding="utf-8"?>
+<file path=ppt/slides/slide7.xml><?xml version="1.0" encoding="utf-8"?>
 <p:sld xmlns:a="http://schemas.openxmlformats.org/drawingml/2006/main" xmlns:r="http://schemas.openxmlformats.org/officeDocument/2006/relationships" xmlns:p="http://schemas.openxmlformats.org/presentationml/2006/main">
   <p:cSld>
     <p:bg>
@@ -4543,6 +5961,132 @@
             <a:r>
               <a:rPr lang="en-CH" dirty="0"/>
               <a:t>THEIR OWN IDENTITY</a:t>
+            </a:r>
+          </a:p>
+        </p:txBody>
+      </p:sp>
+      <p:sp>
+        <p:nvSpPr>
+          <p:cNvPr id="2" name="Rounded Rectangle 1">
+            <a:extLst>
+              <a:ext uri="{FF2B5EF4-FFF2-40B4-BE49-F238E27FC236}">
+                <a16:creationId xmlns:a16="http://schemas.microsoft.com/office/drawing/2014/main" id="{06EDE015-3161-704C-1350-E70588F6E426}"/>
+              </a:ext>
+            </a:extLst>
+          </p:cNvPr>
+          <p:cNvSpPr/>
+          <p:nvPr/>
+        </p:nvSpPr>
+        <p:spPr>
+          <a:xfrm>
+            <a:off x="2665931" y="4460734"/>
+            <a:ext cx="1244183" cy="539646"/>
+          </a:xfrm>
+          <a:prstGeom prst="roundRect">
+            <a:avLst>
+              <a:gd name="adj" fmla="val 14576"/>
+            </a:avLst>
+          </a:prstGeom>
+          <a:solidFill>
+            <a:schemeClr val="bg1"/>
+          </a:solidFill>
+          <a:ln>
+            <a:solidFill>
+              <a:schemeClr val="tx2"/>
+            </a:solidFill>
+          </a:ln>
+        </p:spPr>
+        <p:style>
+          <a:lnRef idx="2">
+            <a:schemeClr val="accent1">
+              <a:shade val="15000"/>
+            </a:schemeClr>
+          </a:lnRef>
+          <a:fillRef idx="1">
+            <a:schemeClr val="accent1"/>
+          </a:fillRef>
+          <a:effectRef idx="0">
+            <a:schemeClr val="accent1"/>
+          </a:effectRef>
+          <a:fontRef idx="minor">
+            <a:schemeClr val="lt1"/>
+          </a:fontRef>
+        </p:style>
+        <p:txBody>
+          <a:bodyPr rtlCol="0" anchor="ctr"/>
+          <a:lstStyle/>
+          <a:p>
+            <a:pPr algn="ctr"/>
+            <a:r>
+              <a:rPr lang="en-CH" sz="1000" dirty="0">
+                <a:solidFill>
+                  <a:schemeClr val="tx1"/>
+                </a:solidFill>
+              </a:rPr>
+              <a:t>The mirror: they are a clay person</a:t>
+            </a:r>
+          </a:p>
+        </p:txBody>
+      </p:sp>
+      <p:sp>
+        <p:nvSpPr>
+          <p:cNvPr id="3" name="Rounded Rectangle 2">
+            <a:extLst>
+              <a:ext uri="{FF2B5EF4-FFF2-40B4-BE49-F238E27FC236}">
+                <a16:creationId xmlns:a16="http://schemas.microsoft.com/office/drawing/2014/main" id="{367E390E-8CF3-CC78-C31A-21E1C0A839FC}"/>
+              </a:ext>
+            </a:extLst>
+          </p:cNvPr>
+          <p:cNvSpPr/>
+          <p:nvPr/>
+        </p:nvSpPr>
+        <p:spPr>
+          <a:xfrm>
+            <a:off x="2665930" y="2593834"/>
+            <a:ext cx="1244183" cy="539646"/>
+          </a:xfrm>
+          <a:prstGeom prst="roundRect">
+            <a:avLst>
+              <a:gd name="adj" fmla="val 14576"/>
+            </a:avLst>
+          </a:prstGeom>
+          <a:solidFill>
+            <a:schemeClr val="bg1"/>
+          </a:solidFill>
+          <a:ln>
+            <a:solidFill>
+              <a:schemeClr val="tx2"/>
+            </a:solidFill>
+          </a:ln>
+        </p:spPr>
+        <p:style>
+          <a:lnRef idx="2">
+            <a:schemeClr val="accent1">
+              <a:shade val="15000"/>
+            </a:schemeClr>
+          </a:lnRef>
+          <a:fillRef idx="1">
+            <a:schemeClr val="accent1"/>
+          </a:fillRef>
+          <a:effectRef idx="0">
+            <a:schemeClr val="accent1"/>
+          </a:effectRef>
+          <a:fontRef idx="minor">
+            <a:schemeClr val="lt1"/>
+          </a:fontRef>
+        </p:style>
+        <p:txBody>
+          <a:bodyPr rtlCol="0" anchor="ctr"/>
+          <a:lstStyle/>
+          <a:p>
+            <a:pPr algn="ctr"/>
+            <a:r>
+              <a:rPr lang="en-CH" sz="1000" dirty="0">
+                <a:solidFill>
+                  <a:schemeClr val="tx1"/>
+                </a:solidFill>
+              </a:rPr>
+              <a:t>The mirror: they are a clay person</a:t>
             </a:r>
           </a:p>
         </p:txBody>

</xml_diff>

<commit_message>
Unimportant godot changes. Various Design Document progress.
</commit_message>
<xml_diff>
--- a/Design Documents/Narration/Narrative Map.pptx
+++ b/Design Documents/Narration/Narrative Map.pptx
@@ -3476,6 +3476,69 @@
           </a:p>
         </p:txBody>
       </p:sp>
+      <p:sp>
+        <p:nvSpPr>
+          <p:cNvPr id="8" name="Rounded Rectangle 7">
+            <a:extLst>
+              <a:ext uri="{FF2B5EF4-FFF2-40B4-BE49-F238E27FC236}">
+                <a16:creationId xmlns:a16="http://schemas.microsoft.com/office/drawing/2014/main" id="{0C68069A-2012-F9DE-DFCD-20D30379497B}"/>
+              </a:ext>
+            </a:extLst>
+          </p:cNvPr>
+          <p:cNvSpPr/>
+          <p:nvPr/>
+        </p:nvSpPr>
+        <p:spPr>
+          <a:xfrm>
+            <a:off x="3340026" y="4895954"/>
+            <a:ext cx="1244183" cy="539646"/>
+          </a:xfrm>
+          <a:prstGeom prst="roundRect">
+            <a:avLst>
+              <a:gd name="adj" fmla="val 14576"/>
+            </a:avLst>
+          </a:prstGeom>
+          <a:solidFill>
+            <a:schemeClr val="bg1"/>
+          </a:solidFill>
+          <a:ln>
+            <a:solidFill>
+              <a:schemeClr val="tx2"/>
+            </a:solidFill>
+          </a:ln>
+        </p:spPr>
+        <p:style>
+          <a:lnRef idx="2">
+            <a:schemeClr val="accent1">
+              <a:shade val="15000"/>
+            </a:schemeClr>
+          </a:lnRef>
+          <a:fillRef idx="1">
+            <a:schemeClr val="accent1"/>
+          </a:fillRef>
+          <a:effectRef idx="0">
+            <a:schemeClr val="accent1"/>
+          </a:effectRef>
+          <a:fontRef idx="minor">
+            <a:schemeClr val="lt1"/>
+          </a:fontRef>
+        </p:style>
+        <p:txBody>
+          <a:bodyPr rtlCol="0" anchor="ctr"/>
+          <a:lstStyle/>
+          <a:p>
+            <a:pPr algn="ctr"/>
+            <a:r>
+              <a:rPr lang="en-CH" sz="1000" dirty="0">
+                <a:solidFill>
+                  <a:schemeClr val="tx1"/>
+                </a:solidFill>
+              </a:rPr>
+              <a:t>It is the Rigid One</a:t>
+            </a:r>
+          </a:p>
+        </p:txBody>
+      </p:sp>
     </p:spTree>
     <p:extLst>
       <p:ext uri="{BB962C8B-B14F-4D97-AF65-F5344CB8AC3E}">
@@ -3651,7 +3714,7 @@
         </p:nvSpPr>
         <p:spPr>
           <a:xfrm>
-            <a:off x="3213271" y="1860654"/>
+            <a:off x="3340026" y="1361918"/>
             <a:ext cx="1244183" cy="539646"/>
           </a:xfrm>
           <a:prstGeom prst="roundRect">
@@ -3717,9 +3780,9 @@
           <p:nvPr/>
         </p:nvCxnSpPr>
         <p:spPr>
-          <a:xfrm rot="5400000">
-            <a:off x="3308262" y="1333552"/>
-            <a:ext cx="1054203" cy="12700"/>
+          <a:xfrm rot="16200000" flipH="1">
+            <a:off x="3621007" y="1020806"/>
+            <a:ext cx="555467" cy="126755"/>
           </a:xfrm>
           <a:prstGeom prst="curvedConnector3">
             <a:avLst>
@@ -3759,6 +3822,1131 @@
           </a:fontRef>
         </p:style>
       </p:cxnSp>
+      <p:sp>
+        <p:nvSpPr>
+          <p:cNvPr id="13" name="Rounded Rectangle 12">
+            <a:extLst>
+              <a:ext uri="{FF2B5EF4-FFF2-40B4-BE49-F238E27FC236}">
+                <a16:creationId xmlns:a16="http://schemas.microsoft.com/office/drawing/2014/main" id="{EE5FE7E8-22FA-EFE8-7D3F-3271EAAD4787}"/>
+              </a:ext>
+            </a:extLst>
+          </p:cNvPr>
+          <p:cNvSpPr/>
+          <p:nvPr/>
+        </p:nvSpPr>
+        <p:spPr>
+          <a:xfrm>
+            <a:off x="4451102" y="2596107"/>
+            <a:ext cx="1244183" cy="539646"/>
+          </a:xfrm>
+          <a:prstGeom prst="roundRect">
+            <a:avLst>
+              <a:gd name="adj" fmla="val 14576"/>
+            </a:avLst>
+          </a:prstGeom>
+          <a:solidFill>
+            <a:schemeClr val="bg1"/>
+          </a:solidFill>
+          <a:ln>
+            <a:solidFill>
+              <a:schemeClr val="tx2"/>
+            </a:solidFill>
+          </a:ln>
+        </p:spPr>
+        <p:style>
+          <a:lnRef idx="2">
+            <a:schemeClr val="accent1">
+              <a:shade val="15000"/>
+            </a:schemeClr>
+          </a:lnRef>
+          <a:fillRef idx="1">
+            <a:schemeClr val="accent1"/>
+          </a:fillRef>
+          <a:effectRef idx="0">
+            <a:schemeClr val="accent1"/>
+          </a:effectRef>
+          <a:fontRef idx="minor">
+            <a:schemeClr val="lt1"/>
+          </a:fontRef>
+        </p:style>
+        <p:txBody>
+          <a:bodyPr rtlCol="0" anchor="ctr"/>
+          <a:lstStyle/>
+          <a:p>
+            <a:pPr algn="ctr"/>
+            <a:r>
+              <a:rPr lang="en-CH" sz="1000" dirty="0">
+                <a:solidFill>
+                  <a:schemeClr val="tx1"/>
+                </a:solidFill>
+              </a:rPr>
+              <a:t>They died of food poisoning</a:t>
+            </a:r>
+          </a:p>
+        </p:txBody>
+      </p:sp>
+      <p:cxnSp>
+        <p:nvCxnSpPr>
+          <p:cNvPr id="40" name="Curved Connector 39">
+            <a:extLst>
+              <a:ext uri="{FF2B5EF4-FFF2-40B4-BE49-F238E27FC236}">
+                <a16:creationId xmlns:a16="http://schemas.microsoft.com/office/drawing/2014/main" id="{759A34B4-D405-06D7-AFDC-ECAF409AF2E4}"/>
+              </a:ext>
+            </a:extLst>
+          </p:cNvPr>
+          <p:cNvCxnSpPr>
+            <a:cxnSpLocks/>
+            <a:stCxn id="5" idx="2"/>
+            <a:endCxn id="13" idx="0"/>
+          </p:cNvCxnSpPr>
+          <p:nvPr/>
+        </p:nvCxnSpPr>
+        <p:spPr>
+          <a:xfrm rot="16200000" flipH="1">
+            <a:off x="4170385" y="1693297"/>
+            <a:ext cx="694543" cy="1111076"/>
+          </a:xfrm>
+          <a:prstGeom prst="curvedConnector3">
+            <a:avLst>
+              <a:gd name="adj1" fmla="val 50000"/>
+            </a:avLst>
+          </a:prstGeom>
+          <a:ln w="12700">
+            <a:gradFill flip="none" rotWithShape="1">
+              <a:gsLst>
+                <a:gs pos="0">
+                  <a:schemeClr val="accent2">
+                    <a:lumMod val="50000"/>
+                  </a:schemeClr>
+                </a:gs>
+                <a:gs pos="100000">
+                  <a:schemeClr val="accent4"/>
+                </a:gs>
+              </a:gsLst>
+              <a:lin ang="2700000" scaled="1"/>
+              <a:tileRect/>
+            </a:gradFill>
+            <a:tailEnd type="triangle"/>
+          </a:ln>
+        </p:spPr>
+        <p:style>
+          <a:lnRef idx="1">
+            <a:schemeClr val="accent1"/>
+          </a:lnRef>
+          <a:fillRef idx="0">
+            <a:schemeClr val="accent1"/>
+          </a:fillRef>
+          <a:effectRef idx="0">
+            <a:schemeClr val="accent1"/>
+          </a:effectRef>
+          <a:fontRef idx="minor">
+            <a:schemeClr val="tx1"/>
+          </a:fontRef>
+        </p:style>
+      </p:cxnSp>
+      <p:sp>
+        <p:nvSpPr>
+          <p:cNvPr id="45" name="Rounded Rectangle 44">
+            <a:extLst>
+              <a:ext uri="{FF2B5EF4-FFF2-40B4-BE49-F238E27FC236}">
+                <a16:creationId xmlns:a16="http://schemas.microsoft.com/office/drawing/2014/main" id="{FC77E049-74ED-FB3C-B6B5-6428671243D6}"/>
+              </a:ext>
+            </a:extLst>
+          </p:cNvPr>
+          <p:cNvSpPr/>
+          <p:nvPr/>
+        </p:nvSpPr>
+        <p:spPr>
+          <a:xfrm>
+            <a:off x="3206919" y="3599978"/>
+            <a:ext cx="1244183" cy="539646"/>
+          </a:xfrm>
+          <a:prstGeom prst="roundRect">
+            <a:avLst>
+              <a:gd name="adj" fmla="val 14576"/>
+            </a:avLst>
+          </a:prstGeom>
+          <a:solidFill>
+            <a:schemeClr val="bg1"/>
+          </a:solidFill>
+          <a:ln>
+            <a:solidFill>
+              <a:schemeClr val="tx2"/>
+            </a:solidFill>
+          </a:ln>
+        </p:spPr>
+        <p:style>
+          <a:lnRef idx="2">
+            <a:schemeClr val="accent1">
+              <a:shade val="15000"/>
+            </a:schemeClr>
+          </a:lnRef>
+          <a:fillRef idx="1">
+            <a:schemeClr val="accent1"/>
+          </a:fillRef>
+          <a:effectRef idx="0">
+            <a:schemeClr val="accent1"/>
+          </a:effectRef>
+          <a:fontRef idx="minor">
+            <a:schemeClr val="lt1"/>
+          </a:fontRef>
+        </p:style>
+        <p:txBody>
+          <a:bodyPr rtlCol="0" anchor="ctr"/>
+          <a:lstStyle/>
+          <a:p>
+            <a:pPr algn="ctr"/>
+            <a:r>
+              <a:rPr lang="en-CH" sz="1000" dirty="0">
+                <a:solidFill>
+                  <a:schemeClr val="tx1"/>
+                </a:solidFill>
+              </a:rPr>
+              <a:t>It was actually R that poisoned them</a:t>
+            </a:r>
+          </a:p>
+        </p:txBody>
+      </p:sp>
+      <p:cxnSp>
+        <p:nvCxnSpPr>
+          <p:cNvPr id="46" name="Curved Connector 45">
+            <a:extLst>
+              <a:ext uri="{FF2B5EF4-FFF2-40B4-BE49-F238E27FC236}">
+                <a16:creationId xmlns:a16="http://schemas.microsoft.com/office/drawing/2014/main" id="{13B8BF7D-B612-90CC-D946-DDC6EA0F6F98}"/>
+              </a:ext>
+            </a:extLst>
+          </p:cNvPr>
+          <p:cNvCxnSpPr>
+            <a:cxnSpLocks/>
+            <a:stCxn id="13" idx="2"/>
+            <a:endCxn id="45" idx="0"/>
+          </p:cNvCxnSpPr>
+          <p:nvPr/>
+        </p:nvCxnSpPr>
+        <p:spPr>
+          <a:xfrm rot="5400000">
+            <a:off x="4218991" y="2745774"/>
+            <a:ext cx="464225" cy="1244183"/>
+          </a:xfrm>
+          <a:prstGeom prst="curvedConnector3">
+            <a:avLst>
+              <a:gd name="adj1" fmla="val 50000"/>
+            </a:avLst>
+          </a:prstGeom>
+          <a:ln w="12700">
+            <a:gradFill flip="none" rotWithShape="1">
+              <a:gsLst>
+                <a:gs pos="0">
+                  <a:schemeClr val="accent2">
+                    <a:lumMod val="50000"/>
+                  </a:schemeClr>
+                </a:gs>
+                <a:gs pos="100000">
+                  <a:schemeClr val="accent4"/>
+                </a:gs>
+              </a:gsLst>
+              <a:lin ang="2700000" scaled="1"/>
+              <a:tileRect/>
+            </a:gradFill>
+            <a:tailEnd type="triangle"/>
+          </a:ln>
+        </p:spPr>
+        <p:style>
+          <a:lnRef idx="1">
+            <a:schemeClr val="accent1"/>
+          </a:lnRef>
+          <a:fillRef idx="0">
+            <a:schemeClr val="accent1"/>
+          </a:fillRef>
+          <a:effectRef idx="0">
+            <a:schemeClr val="accent1"/>
+          </a:effectRef>
+          <a:fontRef idx="minor">
+            <a:schemeClr val="tx1"/>
+          </a:fontRef>
+        </p:style>
+      </p:cxnSp>
+      <p:sp>
+        <p:nvSpPr>
+          <p:cNvPr id="54" name="Rounded Rectangle 53">
+            <a:extLst>
+              <a:ext uri="{FF2B5EF4-FFF2-40B4-BE49-F238E27FC236}">
+                <a16:creationId xmlns:a16="http://schemas.microsoft.com/office/drawing/2014/main" id="{68C1D186-6419-C638-CE02-E19752EB8819}"/>
+              </a:ext>
+            </a:extLst>
+          </p:cNvPr>
+          <p:cNvSpPr/>
+          <p:nvPr/>
+        </p:nvSpPr>
+        <p:spPr>
+          <a:xfrm>
+            <a:off x="1718240" y="1415973"/>
+            <a:ext cx="1244183" cy="539646"/>
+          </a:xfrm>
+          <a:prstGeom prst="roundRect">
+            <a:avLst>
+              <a:gd name="adj" fmla="val 0"/>
+            </a:avLst>
+          </a:prstGeom>
+          <a:solidFill>
+            <a:schemeClr val="tx2">
+              <a:lumMod val="50000"/>
+            </a:schemeClr>
+          </a:solidFill>
+          <a:ln>
+            <a:solidFill>
+              <a:schemeClr val="tx2"/>
+            </a:solidFill>
+          </a:ln>
+        </p:spPr>
+        <p:style>
+          <a:lnRef idx="2">
+            <a:schemeClr val="accent1">
+              <a:shade val="15000"/>
+            </a:schemeClr>
+          </a:lnRef>
+          <a:fillRef idx="1">
+            <a:schemeClr val="accent1"/>
+          </a:fillRef>
+          <a:effectRef idx="0">
+            <a:schemeClr val="accent1"/>
+          </a:effectRef>
+          <a:fontRef idx="minor">
+            <a:schemeClr val="lt1"/>
+          </a:fontRef>
+        </p:style>
+        <p:txBody>
+          <a:bodyPr rtlCol="0" anchor="ctr"/>
+          <a:lstStyle/>
+          <a:p>
+            <a:pPr algn="ctr"/>
+            <a:r>
+              <a:rPr lang="en-CH" sz="1000" dirty="0">
+                <a:solidFill>
+                  <a:schemeClr val="bg1"/>
+                </a:solidFill>
+              </a:rPr>
+              <a:t>Tomb</a:t>
+            </a:r>
+          </a:p>
+        </p:txBody>
+      </p:sp>
+      <p:cxnSp>
+        <p:nvCxnSpPr>
+          <p:cNvPr id="55" name="Curved Connector 54">
+            <a:extLst>
+              <a:ext uri="{FF2B5EF4-FFF2-40B4-BE49-F238E27FC236}">
+                <a16:creationId xmlns:a16="http://schemas.microsoft.com/office/drawing/2014/main" id="{2DC49B8C-169D-BE9C-1768-13380620E774}"/>
+              </a:ext>
+            </a:extLst>
+          </p:cNvPr>
+          <p:cNvCxnSpPr>
+            <a:cxnSpLocks/>
+            <a:stCxn id="54" idx="3"/>
+            <a:endCxn id="5" idx="1"/>
+          </p:cNvCxnSpPr>
+          <p:nvPr/>
+        </p:nvCxnSpPr>
+        <p:spPr>
+          <a:xfrm flipV="1">
+            <a:off x="2962423" y="1631741"/>
+            <a:ext cx="377603" cy="54055"/>
+          </a:xfrm>
+          <a:prstGeom prst="curvedConnector3">
+            <a:avLst>
+              <a:gd name="adj1" fmla="val 50000"/>
+            </a:avLst>
+          </a:prstGeom>
+          <a:ln w="12700">
+            <a:solidFill>
+              <a:schemeClr val="tx2"/>
+            </a:solidFill>
+            <a:headEnd type="oval"/>
+            <a:tailEnd type="oval"/>
+          </a:ln>
+        </p:spPr>
+        <p:style>
+          <a:lnRef idx="1">
+            <a:schemeClr val="accent1"/>
+          </a:lnRef>
+          <a:fillRef idx="0">
+            <a:schemeClr val="accent1"/>
+          </a:fillRef>
+          <a:effectRef idx="0">
+            <a:schemeClr val="accent1"/>
+          </a:effectRef>
+          <a:fontRef idx="minor">
+            <a:schemeClr val="tx1"/>
+          </a:fontRef>
+        </p:style>
+      </p:cxnSp>
+      <p:sp>
+        <p:nvSpPr>
+          <p:cNvPr id="59" name="Rounded Rectangle 58">
+            <a:extLst>
+              <a:ext uri="{FF2B5EF4-FFF2-40B4-BE49-F238E27FC236}">
+                <a16:creationId xmlns:a16="http://schemas.microsoft.com/office/drawing/2014/main" id="{D91DA4C3-0F30-5470-4265-ABA29EC01469}"/>
+              </a:ext>
+            </a:extLst>
+          </p:cNvPr>
+          <p:cNvSpPr/>
+          <p:nvPr/>
+        </p:nvSpPr>
+        <p:spPr>
+          <a:xfrm>
+            <a:off x="2654557" y="2567586"/>
+            <a:ext cx="1244183" cy="539646"/>
+          </a:xfrm>
+          <a:prstGeom prst="roundRect">
+            <a:avLst>
+              <a:gd name="adj" fmla="val 0"/>
+            </a:avLst>
+          </a:prstGeom>
+          <a:solidFill>
+            <a:schemeClr val="tx2">
+              <a:lumMod val="50000"/>
+            </a:schemeClr>
+          </a:solidFill>
+          <a:ln>
+            <a:solidFill>
+              <a:schemeClr val="tx2"/>
+            </a:solidFill>
+          </a:ln>
+        </p:spPr>
+        <p:style>
+          <a:lnRef idx="2">
+            <a:schemeClr val="accent1">
+              <a:shade val="15000"/>
+            </a:schemeClr>
+          </a:lnRef>
+          <a:fillRef idx="1">
+            <a:schemeClr val="accent1"/>
+          </a:fillRef>
+          <a:effectRef idx="0">
+            <a:schemeClr val="accent1"/>
+          </a:effectRef>
+          <a:fontRef idx="minor">
+            <a:schemeClr val="lt1"/>
+          </a:fontRef>
+        </p:style>
+        <p:txBody>
+          <a:bodyPr rtlCol="0" anchor="ctr"/>
+          <a:lstStyle/>
+          <a:p>
+            <a:pPr algn="ctr"/>
+            <a:r>
+              <a:rPr lang="en-CH" sz="1000" dirty="0">
+                <a:solidFill>
+                  <a:schemeClr val="bg1"/>
+                </a:solidFill>
+              </a:rPr>
+              <a:t>Dialog</a:t>
+            </a:r>
+          </a:p>
+        </p:txBody>
+      </p:sp>
+      <p:cxnSp>
+        <p:nvCxnSpPr>
+          <p:cNvPr id="60" name="Curved Connector 59">
+            <a:extLst>
+              <a:ext uri="{FF2B5EF4-FFF2-40B4-BE49-F238E27FC236}">
+                <a16:creationId xmlns:a16="http://schemas.microsoft.com/office/drawing/2014/main" id="{E32CB035-D98B-8F7B-82DD-451BDA08B914}"/>
+              </a:ext>
+            </a:extLst>
+          </p:cNvPr>
+          <p:cNvCxnSpPr>
+            <a:cxnSpLocks/>
+            <a:stCxn id="59" idx="3"/>
+            <a:endCxn id="13" idx="1"/>
+          </p:cNvCxnSpPr>
+          <p:nvPr/>
+        </p:nvCxnSpPr>
+        <p:spPr>
+          <a:xfrm>
+            <a:off x="3898740" y="2837409"/>
+            <a:ext cx="552362" cy="28521"/>
+          </a:xfrm>
+          <a:prstGeom prst="curvedConnector3">
+            <a:avLst>
+              <a:gd name="adj1" fmla="val 50000"/>
+            </a:avLst>
+          </a:prstGeom>
+          <a:ln w="12700">
+            <a:solidFill>
+              <a:schemeClr val="tx2"/>
+            </a:solidFill>
+            <a:headEnd type="oval"/>
+            <a:tailEnd type="oval"/>
+          </a:ln>
+        </p:spPr>
+        <p:style>
+          <a:lnRef idx="1">
+            <a:schemeClr val="accent1"/>
+          </a:lnRef>
+          <a:fillRef idx="0">
+            <a:schemeClr val="accent1"/>
+          </a:fillRef>
+          <a:effectRef idx="0">
+            <a:schemeClr val="accent1"/>
+          </a:effectRef>
+          <a:fontRef idx="minor">
+            <a:schemeClr val="tx1"/>
+          </a:fontRef>
+        </p:style>
+      </p:cxnSp>
+      <p:sp>
+        <p:nvSpPr>
+          <p:cNvPr id="65" name="Rounded Rectangle 64">
+            <a:extLst>
+              <a:ext uri="{FF2B5EF4-FFF2-40B4-BE49-F238E27FC236}">
+                <a16:creationId xmlns:a16="http://schemas.microsoft.com/office/drawing/2014/main" id="{E8D2819E-F14F-801B-3904-0621AD09C8A8}"/>
+              </a:ext>
+            </a:extLst>
+          </p:cNvPr>
+          <p:cNvSpPr/>
+          <p:nvPr/>
+        </p:nvSpPr>
+        <p:spPr>
+          <a:xfrm>
+            <a:off x="1718241" y="3599978"/>
+            <a:ext cx="1244183" cy="539646"/>
+          </a:xfrm>
+          <a:prstGeom prst="roundRect">
+            <a:avLst>
+              <a:gd name="adj" fmla="val 0"/>
+            </a:avLst>
+          </a:prstGeom>
+          <a:solidFill>
+            <a:schemeClr val="tx2">
+              <a:lumMod val="50000"/>
+            </a:schemeClr>
+          </a:solidFill>
+          <a:ln>
+            <a:solidFill>
+              <a:schemeClr val="tx2"/>
+            </a:solidFill>
+          </a:ln>
+        </p:spPr>
+        <p:style>
+          <a:lnRef idx="2">
+            <a:schemeClr val="accent1">
+              <a:shade val="15000"/>
+            </a:schemeClr>
+          </a:lnRef>
+          <a:fillRef idx="1">
+            <a:schemeClr val="accent1"/>
+          </a:fillRef>
+          <a:effectRef idx="0">
+            <a:schemeClr val="accent1"/>
+          </a:effectRef>
+          <a:fontRef idx="minor">
+            <a:schemeClr val="lt1"/>
+          </a:fontRef>
+        </p:style>
+        <p:txBody>
+          <a:bodyPr rtlCol="0" anchor="ctr"/>
+          <a:lstStyle/>
+          <a:p>
+            <a:pPr algn="ctr"/>
+            <a:r>
+              <a:rPr lang="en-CH" sz="1000" dirty="0">
+                <a:solidFill>
+                  <a:schemeClr val="bg1"/>
+                </a:solidFill>
+              </a:rPr>
+              <a:t>Poison in R’s room</a:t>
+            </a:r>
+          </a:p>
+          <a:p>
+            <a:pPr algn="ctr"/>
+            <a:r>
+              <a:rPr lang="en-CH" sz="1000" dirty="0">
+                <a:solidFill>
+                  <a:schemeClr val="bg1"/>
+                </a:solidFill>
+              </a:rPr>
+              <a:t>(and note describing symptoms)</a:t>
+            </a:r>
+          </a:p>
+        </p:txBody>
+      </p:sp>
+      <p:cxnSp>
+        <p:nvCxnSpPr>
+          <p:cNvPr id="66" name="Curved Connector 65">
+            <a:extLst>
+              <a:ext uri="{FF2B5EF4-FFF2-40B4-BE49-F238E27FC236}">
+                <a16:creationId xmlns:a16="http://schemas.microsoft.com/office/drawing/2014/main" id="{9F8A2C69-7761-BD4C-87EA-93411912426E}"/>
+              </a:ext>
+            </a:extLst>
+          </p:cNvPr>
+          <p:cNvCxnSpPr>
+            <a:cxnSpLocks/>
+            <a:stCxn id="65" idx="3"/>
+            <a:endCxn id="45" idx="1"/>
+          </p:cNvCxnSpPr>
+          <p:nvPr/>
+        </p:nvCxnSpPr>
+        <p:spPr>
+          <a:xfrm>
+            <a:off x="2962424" y="3869801"/>
+            <a:ext cx="244495" cy="12700"/>
+          </a:xfrm>
+          <a:prstGeom prst="curvedConnector3">
+            <a:avLst>
+              <a:gd name="adj1" fmla="val 50000"/>
+            </a:avLst>
+          </a:prstGeom>
+          <a:ln w="12700">
+            <a:solidFill>
+              <a:schemeClr val="tx2"/>
+            </a:solidFill>
+            <a:headEnd type="oval"/>
+            <a:tailEnd type="oval"/>
+          </a:ln>
+        </p:spPr>
+        <p:style>
+          <a:lnRef idx="1">
+            <a:schemeClr val="accent1"/>
+          </a:lnRef>
+          <a:fillRef idx="0">
+            <a:schemeClr val="accent1"/>
+          </a:fillRef>
+          <a:effectRef idx="0">
+            <a:schemeClr val="accent1"/>
+          </a:effectRef>
+          <a:fontRef idx="minor">
+            <a:schemeClr val="tx1"/>
+          </a:fontRef>
+        </p:style>
+      </p:cxnSp>
+      <p:sp>
+        <p:nvSpPr>
+          <p:cNvPr id="70" name="Rounded Rectangle 69">
+            <a:extLst>
+              <a:ext uri="{FF2B5EF4-FFF2-40B4-BE49-F238E27FC236}">
+                <a16:creationId xmlns:a16="http://schemas.microsoft.com/office/drawing/2014/main" id="{B9D42908-D703-516A-2379-07092D3A068E}"/>
+              </a:ext>
+            </a:extLst>
+          </p:cNvPr>
+          <p:cNvSpPr/>
+          <p:nvPr/>
+        </p:nvSpPr>
+        <p:spPr>
+          <a:xfrm>
+            <a:off x="2340294" y="5226259"/>
+            <a:ext cx="1244183" cy="539646"/>
+          </a:xfrm>
+          <a:prstGeom prst="roundRect">
+            <a:avLst>
+              <a:gd name="adj" fmla="val 14576"/>
+            </a:avLst>
+          </a:prstGeom>
+          <a:solidFill>
+            <a:schemeClr val="bg1"/>
+          </a:solidFill>
+          <a:ln>
+            <a:solidFill>
+              <a:schemeClr val="tx2"/>
+            </a:solidFill>
+          </a:ln>
+        </p:spPr>
+        <p:style>
+          <a:lnRef idx="2">
+            <a:schemeClr val="accent1">
+              <a:shade val="15000"/>
+            </a:schemeClr>
+          </a:lnRef>
+          <a:fillRef idx="1">
+            <a:schemeClr val="accent1"/>
+          </a:fillRef>
+          <a:effectRef idx="0">
+            <a:schemeClr val="accent1"/>
+          </a:effectRef>
+          <a:fontRef idx="minor">
+            <a:schemeClr val="lt1"/>
+          </a:fontRef>
+        </p:style>
+        <p:txBody>
+          <a:bodyPr rtlCol="0" anchor="ctr"/>
+          <a:lstStyle/>
+          <a:p>
+            <a:pPr algn="ctr"/>
+            <a:r>
+              <a:rPr lang="en-CH" sz="1000" dirty="0">
+                <a:solidFill>
+                  <a:schemeClr val="tx1"/>
+                </a:solidFill>
+              </a:rPr>
+              <a:t>They knew R poisoned them and were not upset</a:t>
+            </a:r>
+          </a:p>
+        </p:txBody>
+      </p:sp>
+      <p:sp>
+        <p:nvSpPr>
+          <p:cNvPr id="71" name="Rounded Rectangle 70">
+            <a:extLst>
+              <a:ext uri="{FF2B5EF4-FFF2-40B4-BE49-F238E27FC236}">
+                <a16:creationId xmlns:a16="http://schemas.microsoft.com/office/drawing/2014/main" id="{72228013-591E-5A1E-377E-BBE5E1A7F0AA}"/>
+              </a:ext>
+            </a:extLst>
+          </p:cNvPr>
+          <p:cNvSpPr/>
+          <p:nvPr/>
+        </p:nvSpPr>
+        <p:spPr>
+          <a:xfrm>
+            <a:off x="5800416" y="4437968"/>
+            <a:ext cx="1244183" cy="539646"/>
+          </a:xfrm>
+          <a:prstGeom prst="roundRect">
+            <a:avLst>
+              <a:gd name="adj" fmla="val 14576"/>
+            </a:avLst>
+          </a:prstGeom>
+          <a:solidFill>
+            <a:schemeClr val="bg1"/>
+          </a:solidFill>
+          <a:ln>
+            <a:solidFill>
+              <a:schemeClr val="tx2"/>
+            </a:solidFill>
+          </a:ln>
+        </p:spPr>
+        <p:style>
+          <a:lnRef idx="2">
+            <a:schemeClr val="accent1">
+              <a:shade val="15000"/>
+            </a:schemeClr>
+          </a:lnRef>
+          <a:fillRef idx="1">
+            <a:schemeClr val="accent1"/>
+          </a:fillRef>
+          <a:effectRef idx="0">
+            <a:schemeClr val="accent1"/>
+          </a:effectRef>
+          <a:fontRef idx="minor">
+            <a:schemeClr val="lt1"/>
+          </a:fontRef>
+        </p:style>
+        <p:txBody>
+          <a:bodyPr rtlCol="0" anchor="ctr"/>
+          <a:lstStyle/>
+          <a:p>
+            <a:pPr algn="ctr"/>
+            <a:endParaRPr lang="en-CH" sz="1000" dirty="0">
+              <a:solidFill>
+                <a:schemeClr val="tx1"/>
+              </a:solidFill>
+            </a:endParaRPr>
+          </a:p>
+        </p:txBody>
+      </p:sp>
+      <p:cxnSp>
+        <p:nvCxnSpPr>
+          <p:cNvPr id="80" name="Curved Connector 79">
+            <a:extLst>
+              <a:ext uri="{FF2B5EF4-FFF2-40B4-BE49-F238E27FC236}">
+                <a16:creationId xmlns:a16="http://schemas.microsoft.com/office/drawing/2014/main" id="{3E897583-8CAC-F54E-E821-ED99004AD360}"/>
+              </a:ext>
+            </a:extLst>
+          </p:cNvPr>
+          <p:cNvCxnSpPr>
+            <a:cxnSpLocks/>
+            <a:stCxn id="45" idx="2"/>
+            <a:endCxn id="71" idx="1"/>
+          </p:cNvCxnSpPr>
+          <p:nvPr/>
+        </p:nvCxnSpPr>
+        <p:spPr>
+          <a:xfrm rot="16200000" flipH="1">
+            <a:off x="4530630" y="3438004"/>
+            <a:ext cx="568167" cy="1971405"/>
+          </a:xfrm>
+          <a:prstGeom prst="curvedConnector2">
+            <a:avLst/>
+          </a:prstGeom>
+          <a:ln w="12700">
+            <a:gradFill flip="none" rotWithShape="1">
+              <a:gsLst>
+                <a:gs pos="0">
+                  <a:schemeClr val="accent2">
+                    <a:lumMod val="50000"/>
+                  </a:schemeClr>
+                </a:gs>
+                <a:gs pos="100000">
+                  <a:schemeClr val="accent4"/>
+                </a:gs>
+              </a:gsLst>
+              <a:lin ang="2700000" scaled="1"/>
+              <a:tileRect/>
+            </a:gradFill>
+            <a:tailEnd type="triangle"/>
+          </a:ln>
+        </p:spPr>
+        <p:style>
+          <a:lnRef idx="1">
+            <a:schemeClr val="accent1"/>
+          </a:lnRef>
+          <a:fillRef idx="0">
+            <a:schemeClr val="accent1"/>
+          </a:fillRef>
+          <a:effectRef idx="0">
+            <a:schemeClr val="accent1"/>
+          </a:effectRef>
+          <a:fontRef idx="minor">
+            <a:schemeClr val="tx1"/>
+          </a:fontRef>
+        </p:style>
+      </p:cxnSp>
+      <p:cxnSp>
+        <p:nvCxnSpPr>
+          <p:cNvPr id="83" name="Curved Connector 82">
+            <a:extLst>
+              <a:ext uri="{FF2B5EF4-FFF2-40B4-BE49-F238E27FC236}">
+                <a16:creationId xmlns:a16="http://schemas.microsoft.com/office/drawing/2014/main" id="{2F5F3F3B-CFAB-4FE9-BB3C-B4F4D28FFCE4}"/>
+              </a:ext>
+            </a:extLst>
+          </p:cNvPr>
+          <p:cNvCxnSpPr>
+            <a:cxnSpLocks/>
+            <a:stCxn id="45" idx="2"/>
+            <a:endCxn id="70" idx="0"/>
+          </p:cNvCxnSpPr>
+          <p:nvPr/>
+        </p:nvCxnSpPr>
+        <p:spPr>
+          <a:xfrm rot="5400000">
+            <a:off x="2852382" y="4249629"/>
+            <a:ext cx="1086635" cy="866625"/>
+          </a:xfrm>
+          <a:prstGeom prst="curvedConnector3">
+            <a:avLst>
+              <a:gd name="adj1" fmla="val 50000"/>
+            </a:avLst>
+          </a:prstGeom>
+          <a:ln w="12700">
+            <a:gradFill flip="none" rotWithShape="1">
+              <a:gsLst>
+                <a:gs pos="0">
+                  <a:schemeClr val="accent2">
+                    <a:lumMod val="50000"/>
+                  </a:schemeClr>
+                </a:gs>
+                <a:gs pos="100000">
+                  <a:schemeClr val="accent4"/>
+                </a:gs>
+              </a:gsLst>
+              <a:lin ang="2700000" scaled="1"/>
+              <a:tileRect/>
+            </a:gradFill>
+            <a:tailEnd type="triangle"/>
+          </a:ln>
+        </p:spPr>
+        <p:style>
+          <a:lnRef idx="1">
+            <a:schemeClr val="accent1"/>
+          </a:lnRef>
+          <a:fillRef idx="0">
+            <a:schemeClr val="accent1"/>
+          </a:fillRef>
+          <a:effectRef idx="0">
+            <a:schemeClr val="accent1"/>
+          </a:effectRef>
+          <a:fontRef idx="minor">
+            <a:schemeClr val="tx1"/>
+          </a:fontRef>
+        </p:style>
+      </p:cxnSp>
+      <p:sp>
+        <p:nvSpPr>
+          <p:cNvPr id="87" name="Rounded Rectangle 86">
+            <a:extLst>
+              <a:ext uri="{FF2B5EF4-FFF2-40B4-BE49-F238E27FC236}">
+                <a16:creationId xmlns:a16="http://schemas.microsoft.com/office/drawing/2014/main" id="{9E2BD3D6-2293-6362-0028-C8C505F1D6B9}"/>
+              </a:ext>
+            </a:extLst>
+          </p:cNvPr>
+          <p:cNvSpPr/>
+          <p:nvPr/>
+        </p:nvSpPr>
+        <p:spPr>
+          <a:xfrm>
+            <a:off x="4814714" y="5310359"/>
+            <a:ext cx="1244183" cy="539646"/>
+          </a:xfrm>
+          <a:prstGeom prst="roundRect">
+            <a:avLst>
+              <a:gd name="adj" fmla="val 0"/>
+            </a:avLst>
+          </a:prstGeom>
+          <a:solidFill>
+            <a:schemeClr val="tx2">
+              <a:lumMod val="50000"/>
+            </a:schemeClr>
+          </a:solidFill>
+          <a:ln>
+            <a:solidFill>
+              <a:schemeClr val="tx2"/>
+            </a:solidFill>
+          </a:ln>
+        </p:spPr>
+        <p:style>
+          <a:lnRef idx="2">
+            <a:schemeClr val="accent1">
+              <a:shade val="15000"/>
+            </a:schemeClr>
+          </a:lnRef>
+          <a:fillRef idx="1">
+            <a:schemeClr val="accent1"/>
+          </a:fillRef>
+          <a:effectRef idx="0">
+            <a:schemeClr val="accent1"/>
+          </a:effectRef>
+          <a:fontRef idx="minor">
+            <a:schemeClr val="lt1"/>
+          </a:fontRef>
+        </p:style>
+        <p:txBody>
+          <a:bodyPr rtlCol="0" anchor="ctr"/>
+          <a:lstStyle/>
+          <a:p>
+            <a:pPr algn="ctr"/>
+            <a:r>
+              <a:rPr lang="en-CH" sz="1000" dirty="0">
+                <a:solidFill>
+                  <a:schemeClr val="bg1"/>
+                </a:solidFill>
+              </a:rPr>
+              <a:t>Dialog</a:t>
+            </a:r>
+          </a:p>
+        </p:txBody>
+      </p:sp>
+      <p:cxnSp>
+        <p:nvCxnSpPr>
+          <p:cNvPr id="88" name="Curved Connector 87">
+            <a:extLst>
+              <a:ext uri="{FF2B5EF4-FFF2-40B4-BE49-F238E27FC236}">
+                <a16:creationId xmlns:a16="http://schemas.microsoft.com/office/drawing/2014/main" id="{9C1D6E24-F0F9-C06F-AA33-86C1F9A16D57}"/>
+              </a:ext>
+            </a:extLst>
+          </p:cNvPr>
+          <p:cNvCxnSpPr>
+            <a:cxnSpLocks/>
+            <a:stCxn id="87" idx="3"/>
+            <a:endCxn id="71" idx="2"/>
+          </p:cNvCxnSpPr>
+          <p:nvPr/>
+        </p:nvCxnSpPr>
+        <p:spPr>
+          <a:xfrm flipV="1">
+            <a:off x="6058897" y="4977614"/>
+            <a:ext cx="363611" cy="602568"/>
+          </a:xfrm>
+          <a:prstGeom prst="curvedConnector2">
+            <a:avLst/>
+          </a:prstGeom>
+          <a:ln w="12700">
+            <a:solidFill>
+              <a:schemeClr val="tx2"/>
+            </a:solidFill>
+            <a:headEnd type="oval"/>
+            <a:tailEnd type="oval"/>
+          </a:ln>
+        </p:spPr>
+        <p:style>
+          <a:lnRef idx="1">
+            <a:schemeClr val="accent1"/>
+          </a:lnRef>
+          <a:fillRef idx="0">
+            <a:schemeClr val="accent1"/>
+          </a:fillRef>
+          <a:effectRef idx="0">
+            <a:schemeClr val="accent1"/>
+          </a:effectRef>
+          <a:fontRef idx="minor">
+            <a:schemeClr val="tx1"/>
+          </a:fontRef>
+        </p:style>
+      </p:cxnSp>
+      <p:sp>
+        <p:nvSpPr>
+          <p:cNvPr id="93" name="Rounded Rectangle 92">
+            <a:extLst>
+              <a:ext uri="{FF2B5EF4-FFF2-40B4-BE49-F238E27FC236}">
+                <a16:creationId xmlns:a16="http://schemas.microsoft.com/office/drawing/2014/main" id="{A15E69FB-9363-5445-17F9-7E3BF21BE36F}"/>
+              </a:ext>
+            </a:extLst>
+          </p:cNvPr>
+          <p:cNvSpPr/>
+          <p:nvPr/>
+        </p:nvSpPr>
+        <p:spPr>
+          <a:xfrm>
+            <a:off x="851576" y="5226259"/>
+            <a:ext cx="1244183" cy="539646"/>
+          </a:xfrm>
+          <a:prstGeom prst="roundRect">
+            <a:avLst>
+              <a:gd name="adj" fmla="val 0"/>
+            </a:avLst>
+          </a:prstGeom>
+          <a:solidFill>
+            <a:schemeClr val="tx2">
+              <a:lumMod val="50000"/>
+            </a:schemeClr>
+          </a:solidFill>
+          <a:ln>
+            <a:solidFill>
+              <a:schemeClr val="tx2"/>
+            </a:solidFill>
+          </a:ln>
+        </p:spPr>
+        <p:style>
+          <a:lnRef idx="2">
+            <a:schemeClr val="accent1">
+              <a:shade val="15000"/>
+            </a:schemeClr>
+          </a:lnRef>
+          <a:fillRef idx="1">
+            <a:schemeClr val="accent1"/>
+          </a:fillRef>
+          <a:effectRef idx="0">
+            <a:schemeClr val="accent1"/>
+          </a:effectRef>
+          <a:fontRef idx="minor">
+            <a:schemeClr val="lt1"/>
+          </a:fontRef>
+        </p:style>
+        <p:txBody>
+          <a:bodyPr rtlCol="0" anchor="ctr"/>
+          <a:lstStyle/>
+          <a:p>
+            <a:pPr algn="ctr"/>
+            <a:r>
+              <a:rPr lang="en-CH" sz="1000" dirty="0">
+                <a:solidFill>
+                  <a:schemeClr val="bg1"/>
+                </a:solidFill>
+              </a:rPr>
+              <a:t>Dialog</a:t>
+            </a:r>
+          </a:p>
+        </p:txBody>
+      </p:sp>
+      <p:cxnSp>
+        <p:nvCxnSpPr>
+          <p:cNvPr id="94" name="Curved Connector 93">
+            <a:extLst>
+              <a:ext uri="{FF2B5EF4-FFF2-40B4-BE49-F238E27FC236}">
+                <a16:creationId xmlns:a16="http://schemas.microsoft.com/office/drawing/2014/main" id="{815403D5-81E7-FBEE-0F9D-AE8CC3F55F08}"/>
+              </a:ext>
+            </a:extLst>
+          </p:cNvPr>
+          <p:cNvCxnSpPr>
+            <a:cxnSpLocks/>
+            <a:stCxn id="93" idx="3"/>
+            <a:endCxn id="70" idx="1"/>
+          </p:cNvCxnSpPr>
+          <p:nvPr/>
+        </p:nvCxnSpPr>
+        <p:spPr>
+          <a:xfrm>
+            <a:off x="2095759" y="5496082"/>
+            <a:ext cx="244535" cy="12700"/>
+          </a:xfrm>
+          <a:prstGeom prst="curvedConnector3">
+            <a:avLst>
+              <a:gd name="adj1" fmla="val 50000"/>
+            </a:avLst>
+          </a:prstGeom>
+          <a:ln w="12700">
+            <a:solidFill>
+              <a:schemeClr val="tx2"/>
+            </a:solidFill>
+            <a:headEnd type="oval"/>
+            <a:tailEnd type="oval"/>
+          </a:ln>
+        </p:spPr>
+        <p:style>
+          <a:lnRef idx="1">
+            <a:schemeClr val="accent1"/>
+          </a:lnRef>
+          <a:fillRef idx="0">
+            <a:schemeClr val="accent1"/>
+          </a:fillRef>
+          <a:effectRef idx="0">
+            <a:schemeClr val="accent1"/>
+          </a:effectRef>
+          <a:fontRef idx="minor">
+            <a:schemeClr val="tx1"/>
+          </a:fontRef>
+        </p:style>
+      </p:cxnSp>
+      <p:sp>
+        <p:nvSpPr>
+          <p:cNvPr id="103" name="Rounded Rectangle 102">
+            <a:extLst>
+              <a:ext uri="{FF2B5EF4-FFF2-40B4-BE49-F238E27FC236}">
+                <a16:creationId xmlns:a16="http://schemas.microsoft.com/office/drawing/2014/main" id="{6C1D5BBE-A132-257A-C40A-AA2044C16166}"/>
+              </a:ext>
+            </a:extLst>
+          </p:cNvPr>
+          <p:cNvSpPr/>
+          <p:nvPr/>
+        </p:nvSpPr>
+        <p:spPr>
+          <a:xfrm>
+            <a:off x="6496717" y="2567586"/>
+            <a:ext cx="1244183" cy="539646"/>
+          </a:xfrm>
+          <a:prstGeom prst="roundRect">
+            <a:avLst>
+              <a:gd name="adj" fmla="val 14576"/>
+            </a:avLst>
+          </a:prstGeom>
+          <a:solidFill>
+            <a:schemeClr val="bg1"/>
+          </a:solidFill>
+          <a:ln>
+            <a:solidFill>
+              <a:schemeClr val="tx2"/>
+            </a:solidFill>
+          </a:ln>
+        </p:spPr>
+        <p:style>
+          <a:lnRef idx="2">
+            <a:schemeClr val="accent1">
+              <a:shade val="15000"/>
+            </a:schemeClr>
+          </a:lnRef>
+          <a:fillRef idx="1">
+            <a:schemeClr val="accent1"/>
+          </a:fillRef>
+          <a:effectRef idx="0">
+            <a:schemeClr val="accent1"/>
+          </a:effectRef>
+          <a:fontRef idx="minor">
+            <a:schemeClr val="lt1"/>
+          </a:fontRef>
+        </p:style>
+        <p:txBody>
+          <a:bodyPr rtlCol="0" anchor="ctr"/>
+          <a:lstStyle/>
+          <a:p>
+            <a:pPr algn="ctr"/>
+            <a:r>
+              <a:rPr lang="en-CH" sz="1000" dirty="0">
+                <a:solidFill>
+                  <a:schemeClr val="tx1"/>
+                </a:solidFill>
+              </a:rPr>
+              <a:t>It was actually R that poisoned them</a:t>
+            </a:r>
+          </a:p>
+        </p:txBody>
+      </p:sp>
     </p:spTree>
     <p:extLst>
       <p:ext uri="{BB962C8B-B14F-4D97-AF65-F5344CB8AC3E}">
@@ -4689,7 +5877,7 @@
         </p:nvSpPr>
         <p:spPr>
           <a:xfrm>
-            <a:off x="5473908" y="2133598"/>
+            <a:off x="5574883" y="1415007"/>
             <a:ext cx="1244183" cy="539646"/>
           </a:xfrm>
           <a:prstGeom prst="roundRect">
@@ -4733,7 +5921,7 @@
                   <a:schemeClr val="tx1"/>
                 </a:solidFill>
               </a:rPr>
-              <a:t>They wrote their anger on the walls</a:t>
+              <a:t>Someone angrily wrote on the walls</a:t>
             </a:r>
           </a:p>
         </p:txBody>
@@ -4801,6 +5989,128 @@
           </a:p>
         </p:txBody>
       </p:sp>
+      <p:sp>
+        <p:nvSpPr>
+          <p:cNvPr id="19" name="Rounded Rectangle 18">
+            <a:extLst>
+              <a:ext uri="{FF2B5EF4-FFF2-40B4-BE49-F238E27FC236}">
+                <a16:creationId xmlns:a16="http://schemas.microsoft.com/office/drawing/2014/main" id="{392AA1AA-4DF8-8FE2-E29B-D21780574509}"/>
+              </a:ext>
+            </a:extLst>
+          </p:cNvPr>
+          <p:cNvSpPr/>
+          <p:nvPr/>
+        </p:nvSpPr>
+        <p:spPr>
+          <a:xfrm>
+            <a:off x="6717883" y="2627492"/>
+            <a:ext cx="1244183" cy="539646"/>
+          </a:xfrm>
+          <a:prstGeom prst="roundRect">
+            <a:avLst>
+              <a:gd name="adj" fmla="val 14576"/>
+            </a:avLst>
+          </a:prstGeom>
+          <a:solidFill>
+            <a:schemeClr val="bg1"/>
+          </a:solidFill>
+          <a:ln>
+            <a:solidFill>
+              <a:schemeClr val="tx2"/>
+            </a:solidFill>
+          </a:ln>
+        </p:spPr>
+        <p:style>
+          <a:lnRef idx="2">
+            <a:schemeClr val="accent1">
+              <a:shade val="15000"/>
+            </a:schemeClr>
+          </a:lnRef>
+          <a:fillRef idx="1">
+            <a:schemeClr val="accent1"/>
+          </a:fillRef>
+          <a:effectRef idx="0">
+            <a:schemeClr val="accent1"/>
+          </a:effectRef>
+          <a:fontRef idx="minor">
+            <a:schemeClr val="lt1"/>
+          </a:fontRef>
+        </p:style>
+        <p:txBody>
+          <a:bodyPr rtlCol="0" anchor="ctr"/>
+          <a:lstStyle/>
+          <a:p>
+            <a:pPr algn="ctr"/>
+            <a:r>
+              <a:rPr lang="en-CH" sz="1000" dirty="0">
+                <a:solidFill>
+                  <a:schemeClr val="tx1"/>
+                </a:solidFill>
+              </a:rPr>
+              <a:t>They were the one writing on the walls</a:t>
+            </a:r>
+          </a:p>
+        </p:txBody>
+      </p:sp>
+      <p:cxnSp>
+        <p:nvCxnSpPr>
+          <p:cNvPr id="20" name="Curved Connector 19">
+            <a:extLst>
+              <a:ext uri="{FF2B5EF4-FFF2-40B4-BE49-F238E27FC236}">
+                <a16:creationId xmlns:a16="http://schemas.microsoft.com/office/drawing/2014/main" id="{8C507E1D-F7A3-9407-3A36-C566CBED7CAD}"/>
+              </a:ext>
+            </a:extLst>
+          </p:cNvPr>
+          <p:cNvCxnSpPr>
+            <a:cxnSpLocks/>
+            <a:stCxn id="15" idx="2"/>
+            <a:endCxn id="19" idx="0"/>
+          </p:cNvCxnSpPr>
+          <p:nvPr/>
+        </p:nvCxnSpPr>
+        <p:spPr>
+          <a:xfrm rot="16200000" flipH="1">
+            <a:off x="6432056" y="1719572"/>
+            <a:ext cx="672839" cy="1143000"/>
+          </a:xfrm>
+          <a:prstGeom prst="curvedConnector3">
+            <a:avLst>
+              <a:gd name="adj1" fmla="val 50000"/>
+            </a:avLst>
+          </a:prstGeom>
+          <a:ln w="12700">
+            <a:gradFill flip="none" rotWithShape="1">
+              <a:gsLst>
+                <a:gs pos="0">
+                  <a:schemeClr val="accent2">
+                    <a:lumMod val="50000"/>
+                  </a:schemeClr>
+                </a:gs>
+                <a:gs pos="100000">
+                  <a:schemeClr val="accent4"/>
+                </a:gs>
+              </a:gsLst>
+              <a:lin ang="2700000" scaled="1"/>
+              <a:tileRect/>
+            </a:gradFill>
+            <a:tailEnd type="triangle"/>
+          </a:ln>
+        </p:spPr>
+        <p:style>
+          <a:lnRef idx="1">
+            <a:schemeClr val="accent1"/>
+          </a:lnRef>
+          <a:fillRef idx="0">
+            <a:schemeClr val="accent1"/>
+          </a:fillRef>
+          <a:effectRef idx="0">
+            <a:schemeClr val="accent1"/>
+          </a:effectRef>
+          <a:fontRef idx="minor">
+            <a:schemeClr val="tx1"/>
+          </a:fontRef>
+        </p:style>
+      </p:cxnSp>
     </p:spTree>
     <p:extLst>
       <p:ext uri="{BB962C8B-B14F-4D97-AF65-F5344CB8AC3E}">
@@ -5017,7 +6327,7 @@
                   <a:schemeClr val="tx1"/>
                 </a:solidFill>
               </a:rPr>
-              <a:t>They make tools out of clay-magic</a:t>
+              <a:t>They made tools out of clay-magic</a:t>
             </a:r>
           </a:p>
         </p:txBody>
@@ -5099,7 +6409,7 @@
         </p:nvSpPr>
         <p:spPr>
           <a:xfrm>
-            <a:off x="2216136" y="3810713"/>
+            <a:off x="2216137" y="4006536"/>
             <a:ext cx="1244183" cy="539646"/>
           </a:xfrm>
           <a:prstGeom prst="roundRect">
@@ -5162,7 +6472,7 @@
         </p:nvSpPr>
         <p:spPr>
           <a:xfrm>
-            <a:off x="5305448" y="2935930"/>
+            <a:off x="5305448" y="2834746"/>
             <a:ext cx="1244183" cy="539646"/>
           </a:xfrm>
           <a:prstGeom prst="roundRect">
@@ -5225,7 +6535,7 @@
         </p:nvSpPr>
         <p:spPr>
           <a:xfrm>
-            <a:off x="5927539" y="1847805"/>
+            <a:off x="5305447" y="1438133"/>
             <a:ext cx="1244183" cy="539646"/>
           </a:xfrm>
           <a:prstGeom prst="roundRect">
@@ -5412,8 +6722,8 @@
         </p:nvCxnSpPr>
         <p:spPr>
           <a:xfrm rot="16200000" flipH="1">
-            <a:off x="1341353" y="3205753"/>
-            <a:ext cx="706144" cy="1043422"/>
+            <a:off x="1243442" y="3303663"/>
+            <a:ext cx="901967" cy="1043423"/>
           </a:xfrm>
           <a:prstGeom prst="curvedConnector2">
             <a:avLst/>
@@ -5469,8 +6779,8 @@
         </p:nvCxnSpPr>
         <p:spPr>
           <a:xfrm rot="5400000">
-            <a:off x="2931114" y="3281507"/>
-            <a:ext cx="436321" cy="622091"/>
+            <a:off x="2833202" y="3379419"/>
+            <a:ext cx="632144" cy="622090"/>
           </a:xfrm>
           <a:prstGeom prst="curvedConnector3">
             <a:avLst>
@@ -5528,8 +6838,8 @@
         </p:nvCxnSpPr>
         <p:spPr>
           <a:xfrm rot="5400000">
-            <a:off x="1967774" y="4484245"/>
-            <a:ext cx="1004340" cy="736568"/>
+            <a:off x="2065687" y="4582156"/>
+            <a:ext cx="808517" cy="736569"/>
           </a:xfrm>
           <a:prstGeom prst="curvedConnector3">
             <a:avLst>
@@ -5587,8 +6897,8 @@
         </p:nvCxnSpPr>
         <p:spPr>
           <a:xfrm rot="16200000" flipH="1">
-            <a:off x="3936749" y="1837053"/>
-            <a:ext cx="1227973" cy="1509425"/>
+            <a:off x="3987341" y="1786461"/>
+            <a:ext cx="1126789" cy="1509425"/>
           </a:xfrm>
           <a:prstGeom prst="curvedConnector2">
             <a:avLst/>
@@ -5707,8 +7017,8 @@
         </p:nvCxnSpPr>
         <p:spPr>
           <a:xfrm rot="16200000" flipH="1">
-            <a:off x="2835552" y="4353035"/>
-            <a:ext cx="938491" cy="933138"/>
+            <a:off x="2933463" y="4450947"/>
+            <a:ext cx="742668" cy="933137"/>
           </a:xfrm>
           <a:prstGeom prst="curvedConnector3">
             <a:avLst>
@@ -5980,69 +7290,6 @@
         <p:spPr>
           <a:xfrm>
             <a:off x="2665931" y="4460734"/>
-            <a:ext cx="1244183" cy="539646"/>
-          </a:xfrm>
-          <a:prstGeom prst="roundRect">
-            <a:avLst>
-              <a:gd name="adj" fmla="val 14576"/>
-            </a:avLst>
-          </a:prstGeom>
-          <a:solidFill>
-            <a:schemeClr val="bg1"/>
-          </a:solidFill>
-          <a:ln>
-            <a:solidFill>
-              <a:schemeClr val="tx2"/>
-            </a:solidFill>
-          </a:ln>
-        </p:spPr>
-        <p:style>
-          <a:lnRef idx="2">
-            <a:schemeClr val="accent1">
-              <a:shade val="15000"/>
-            </a:schemeClr>
-          </a:lnRef>
-          <a:fillRef idx="1">
-            <a:schemeClr val="accent1"/>
-          </a:fillRef>
-          <a:effectRef idx="0">
-            <a:schemeClr val="accent1"/>
-          </a:effectRef>
-          <a:fontRef idx="minor">
-            <a:schemeClr val="lt1"/>
-          </a:fontRef>
-        </p:style>
-        <p:txBody>
-          <a:bodyPr rtlCol="0" anchor="ctr"/>
-          <a:lstStyle/>
-          <a:p>
-            <a:pPr algn="ctr"/>
-            <a:r>
-              <a:rPr lang="en-CH" sz="1000" dirty="0">
-                <a:solidFill>
-                  <a:schemeClr val="tx1"/>
-                </a:solidFill>
-              </a:rPr>
-              <a:t>The mirror: they are a clay person</a:t>
-            </a:r>
-          </a:p>
-        </p:txBody>
-      </p:sp>
-      <p:sp>
-        <p:nvSpPr>
-          <p:cNvPr id="3" name="Rounded Rectangle 2">
-            <a:extLst>
-              <a:ext uri="{FF2B5EF4-FFF2-40B4-BE49-F238E27FC236}">
-                <a16:creationId xmlns:a16="http://schemas.microsoft.com/office/drawing/2014/main" id="{367E390E-8CF3-CC78-C31A-21E1C0A839FC}"/>
-              </a:ext>
-            </a:extLst>
-          </p:cNvPr>
-          <p:cNvSpPr/>
-          <p:nvPr/>
-        </p:nvSpPr>
-        <p:spPr>
-          <a:xfrm>
-            <a:off x="2665930" y="2593834"/>
             <a:ext cx="1244183" cy="539646"/>
           </a:xfrm>
           <a:prstGeom prst="roundRect">

</xml_diff>